<commit_message>
Updated Windows 10 Game Jam PPTX
</commit_message>
<xml_diff>
--- a/Windows 10 Game Jam/Windows 10 GameJam Sevilla.pptx
+++ b/Windows 10 Game Jam/Windows 10 GameJam Sevilla.pptx
@@ -5,18 +5,19 @@
     <p:sldMasterId id="2147483717" r:id="rId4"/>
   </p:sldMasterIdLst>
   <p:notesMasterIdLst>
-    <p:notesMasterId r:id="rId14"/>
+    <p:notesMasterId r:id="rId15"/>
   </p:notesMasterIdLst>
   <p:sldIdLst>
     <p:sldId id="256" r:id="rId5"/>
-    <p:sldId id="272" r:id="rId6"/>
-    <p:sldId id="276" r:id="rId7"/>
-    <p:sldId id="274" r:id="rId8"/>
-    <p:sldId id="275" r:id="rId9"/>
-    <p:sldId id="270" r:id="rId10"/>
-    <p:sldId id="273" r:id="rId11"/>
-    <p:sldId id="271" r:id="rId12"/>
-    <p:sldId id="269" r:id="rId13"/>
+    <p:sldId id="277" r:id="rId6"/>
+    <p:sldId id="272" r:id="rId7"/>
+    <p:sldId id="276" r:id="rId8"/>
+    <p:sldId id="274" r:id="rId9"/>
+    <p:sldId id="275" r:id="rId10"/>
+    <p:sldId id="270" r:id="rId11"/>
+    <p:sldId id="273" r:id="rId12"/>
+    <p:sldId id="271" r:id="rId13"/>
+    <p:sldId id="269" r:id="rId14"/>
   </p:sldIdLst>
   <p:sldSz cx="12192000" cy="6858000"/>
   <p:notesSz cx="6858000" cy="9144000"/>
@@ -208,7 +209,7 @@
           <a:p>
             <a:fld id="{B390C43E-5EEF-443B-AEB9-2D45B8F4AF4F}" type="datetimeFigureOut">
               <a:rPr lang="en-US" smtClean="0"/>
-              <a:t>5/8/2015</a:t>
+              <a:t>5/10/2015</a:t>
             </a:fld>
             <a:endParaRPr lang="en-US"/>
           </a:p>
@@ -560,7 +561,7 @@
           <a:p>
             <a:fld id="{B59DFEC3-DDF1-47FC-A429-F37F4C396648}" type="slidenum">
               <a:rPr lang="en-US" smtClean="0"/>
-              <a:t>2</a:t>
+              <a:t>3</a:t>
             </a:fld>
             <a:endParaRPr lang="en-US"/>
           </a:p>
@@ -665,7 +666,7 @@
           <a:p>
             <a:fld id="{B59DFEC3-DDF1-47FC-A429-F37F4C396648}" type="slidenum">
               <a:rPr lang="en-US" smtClean="0"/>
-              <a:t>3</a:t>
+              <a:t>4</a:t>
             </a:fld>
             <a:endParaRPr lang="en-US"/>
           </a:p>
@@ -770,7 +771,7 @@
           <a:p>
             <a:fld id="{B59DFEC3-DDF1-47FC-A429-F37F4C396648}" type="slidenum">
               <a:rPr lang="en-US" smtClean="0"/>
-              <a:t>4</a:t>
+              <a:t>5</a:t>
             </a:fld>
             <a:endParaRPr lang="en-US"/>
           </a:p>
@@ -875,7 +876,7 @@
           <a:p>
             <a:fld id="{B59DFEC3-DDF1-47FC-A429-F37F4C396648}" type="slidenum">
               <a:rPr lang="en-US" smtClean="0"/>
-              <a:t>5</a:t>
+              <a:t>6</a:t>
             </a:fld>
             <a:endParaRPr lang="en-US"/>
           </a:p>
@@ -980,7 +981,7 @@
           <a:p>
             <a:fld id="{B59DFEC3-DDF1-47FC-A429-F37F4C396648}" type="slidenum">
               <a:rPr lang="en-US" smtClean="0"/>
-              <a:t>6</a:t>
+              <a:t>7</a:t>
             </a:fld>
             <a:endParaRPr lang="en-US"/>
           </a:p>
@@ -1072,7 +1073,7 @@
           <a:p>
             <a:fld id="{1DCEFCAB-67CC-4A0C-8E3C-462167FA539E}" type="slidenum">
               <a:rPr lang="es-ES" smtClean="0"/>
-              <a:t>7</a:t>
+              <a:t>8</a:t>
             </a:fld>
             <a:endParaRPr lang="es-ES"/>
           </a:p>
@@ -1175,7 +1176,7 @@
           <a:p>
             <a:fld id="{B59DFEC3-DDF1-47FC-A429-F37F4C396648}" type="slidenum">
               <a:rPr lang="en-US" smtClean="0"/>
-              <a:t>8</a:t>
+              <a:t>9</a:t>
             </a:fld>
             <a:endParaRPr lang="en-US"/>
           </a:p>
@@ -1259,7 +1260,7 @@
           <a:p>
             <a:fld id="{5F6749EE-0623-43D7-8084-EC6C776BBF87}" type="slidenum">
               <a:rPr lang="en-US" smtClean="0"/>
-              <a:t>9</a:t>
+              <a:t>10</a:t>
             </a:fld>
             <a:endParaRPr lang="en-US"/>
           </a:p>
@@ -20200,7 +20201,7 @@
                 </a:solidFill>
               </a:rPr>
               <a:pPr/>
-              <a:t>5/8/2015</a:t>
+              <a:t>5/10/2015</a:t>
             </a:fld>
             <a:endParaRPr lang="en-US">
               <a:solidFill>
@@ -20523,7 +20524,7 @@
           <a:p>
             <a:fld id="{6DD3B76A-C5DE-4B9A-BEAE-BBF0DC17AAA8}" type="datetime1">
               <a:rPr lang="en-US" smtClean="0"/>
-              <a:t>5/8/2015</a:t>
+              <a:t>5/10/2015</a:t>
             </a:fld>
             <a:endParaRPr lang="en-US" dirty="0"/>
           </a:p>
@@ -20602,13 +20603,13 @@
   <p:clrMapOvr>
     <a:masterClrMapping/>
   </p:clrMapOvr>
-  <mc:AlternateContent xmlns:mc="http://schemas.openxmlformats.org/markup-compatibility/2006">
-    <mc:Choice xmlns:p14="http://schemas.microsoft.com/office/powerpoint/2010/main" Requires="p14">
+  <mc:AlternateContent xmlns:mc="http://schemas.openxmlformats.org/markup-compatibility/2006" xmlns:p14="http://schemas.microsoft.com/office/powerpoint/2010/main">
+    <mc:Choice Requires="p14">
       <p:transition spd="med" p14:dur="700">
         <p:fade/>
       </p:transition>
     </mc:Choice>
-    <mc:Fallback>
+    <mc:Fallback xmlns="">
       <p:transition spd="med">
         <p:fade/>
       </p:transition>
@@ -26404,11 +26405,6 @@
               </a:rPr>
               <a:t>CartujaDotNet</a:t>
             </a:r>
-            <a:endParaRPr lang="en-US" sz="800" dirty="0" smtClean="0">
-              <a:solidFill>
-                <a:srgbClr val="666666"/>
-              </a:solidFill>
-            </a:endParaRPr>
           </a:p>
         </p:txBody>
       </p:sp>
@@ -26848,7 +26844,923 @@
 </p:sld>
 </file>
 
+<file path=ppt/slides/slide10.xml><?xml version="1.0" encoding="utf-8"?>
+<p:sld xmlns:a="http://schemas.openxmlformats.org/drawingml/2006/main" xmlns:r="http://schemas.openxmlformats.org/officeDocument/2006/relationships" xmlns:p="http://schemas.openxmlformats.org/presentationml/2006/main">
+  <p:cSld>
+    <p:spTree>
+      <p:nvGrpSpPr>
+        <p:cNvPr id="1" name=""/>
+        <p:cNvGrpSpPr/>
+        <p:nvPr/>
+      </p:nvGrpSpPr>
+      <p:grpSpPr>
+        <a:xfrm>
+          <a:off x="0" y="0"/>
+          <a:ext cx="0" cy="0"/>
+          <a:chOff x="0" y="0"/>
+          <a:chExt cx="0" cy="0"/>
+        </a:xfrm>
+      </p:grpSpPr>
+      <p:sp>
+        <p:nvSpPr>
+          <p:cNvPr id="3" name="Title 2"/>
+          <p:cNvSpPr txBox="1">
+            <a:spLocks/>
+          </p:cNvSpPr>
+          <p:nvPr/>
+        </p:nvSpPr>
+        <p:spPr>
+          <a:xfrm>
+            <a:off x="720342" y="736517"/>
+            <a:ext cx="10751313" cy="1614797"/>
+          </a:xfrm>
+          <a:prstGeom prst="rect">
+            <a:avLst/>
+          </a:prstGeom>
+        </p:spPr>
+        <p:txBody>
+          <a:bodyPr/>
+          <a:lstStyle>
+            <a:lvl1pPr algn="l" defTabSz="914377" rtl="0" eaLnBrk="1" latinLnBrk="0" hangingPunct="1">
+              <a:lnSpc>
+                <a:spcPct val="90000"/>
+              </a:lnSpc>
+              <a:spcBef>
+                <a:spcPct val="0"/>
+              </a:spcBef>
+              <a:buNone/>
+              <a:defRPr sz="4800" b="1" kern="1200">
+                <a:solidFill>
+                  <a:schemeClr val="accent1"/>
+                </a:solidFill>
+                <a:latin typeface="+mj-lt"/>
+                <a:ea typeface="+mj-ea"/>
+                <a:cs typeface="+mj-cs"/>
+              </a:defRPr>
+            </a:lvl1pPr>
+          </a:lstStyle>
+          <a:p>
+            <a:r>
+              <a:rPr lang="en-US" sz="7200" dirty="0" smtClean="0">
+                <a:solidFill>
+                  <a:schemeClr val="tx1"/>
+                </a:solidFill>
+              </a:rPr>
+              <a:t>Windows 10 Game Jam</a:t>
+            </a:r>
+            <a:endParaRPr lang="en-US" sz="7200" dirty="0">
+              <a:solidFill>
+                <a:schemeClr val="tx1"/>
+              </a:solidFill>
+            </a:endParaRPr>
+          </a:p>
+        </p:txBody>
+      </p:sp>
+      <p:sp>
+        <p:nvSpPr>
+          <p:cNvPr id="5" name="Subtitle 1"/>
+          <p:cNvSpPr txBox="1">
+            <a:spLocks/>
+          </p:cNvSpPr>
+          <p:nvPr/>
+        </p:nvSpPr>
+        <p:spPr>
+          <a:xfrm>
+            <a:off x="720342" y="2169083"/>
+            <a:ext cx="7608765" cy="2238552"/>
+          </a:xfrm>
+          <a:prstGeom prst="rect">
+            <a:avLst/>
+          </a:prstGeom>
+        </p:spPr>
+        <p:txBody>
+          <a:bodyPr/>
+          <a:lstStyle>
+            <a:lvl1pPr marL="0" indent="0" algn="l" defTabSz="914377" rtl="0" eaLnBrk="1" latinLnBrk="0" hangingPunct="1">
+              <a:lnSpc>
+                <a:spcPct val="90000"/>
+              </a:lnSpc>
+              <a:spcBef>
+                <a:spcPts val="2400"/>
+              </a:spcBef>
+              <a:buFont typeface="Arial" panose="020B0604020202020204" pitchFamily="34" charset="0"/>
+              <a:buNone/>
+              <a:defRPr sz="3733" b="0" kern="1200">
+                <a:solidFill>
+                  <a:schemeClr val="accent1"/>
+                </a:solidFill>
+                <a:latin typeface="+mj-lt"/>
+                <a:ea typeface="+mn-ea"/>
+                <a:cs typeface="+mn-cs"/>
+              </a:defRPr>
+            </a:lvl1pPr>
+            <a:lvl2pPr marL="0" indent="0" algn="l" defTabSz="914377" rtl="0" eaLnBrk="1" latinLnBrk="0" hangingPunct="1">
+              <a:lnSpc>
+                <a:spcPct val="90000"/>
+              </a:lnSpc>
+              <a:spcBef>
+                <a:spcPts val="600"/>
+              </a:spcBef>
+              <a:buFont typeface="Arial" panose="020B0604020202020204" pitchFamily="34" charset="0"/>
+              <a:buNone/>
+              <a:defRPr sz="2400" kern="1200">
+                <a:solidFill>
+                  <a:schemeClr val="tx1"/>
+                </a:solidFill>
+                <a:latin typeface="+mn-lt"/>
+                <a:ea typeface="+mn-ea"/>
+                <a:cs typeface="+mn-cs"/>
+              </a:defRPr>
+            </a:lvl2pPr>
+            <a:lvl3pPr marL="233357" indent="-228594" algn="l" defTabSz="914377" rtl="0" eaLnBrk="1" latinLnBrk="0" hangingPunct="1">
+              <a:lnSpc>
+                <a:spcPct val="90000"/>
+              </a:lnSpc>
+              <a:spcBef>
+                <a:spcPts val="600"/>
+              </a:spcBef>
+              <a:buFont typeface="Arial" panose="020B0604020202020204" pitchFamily="34" charset="0"/>
+              <a:buChar char="•"/>
+              <a:defRPr sz="2400" kern="1200">
+                <a:solidFill>
+                  <a:schemeClr val="tx1"/>
+                </a:solidFill>
+                <a:latin typeface="+mn-lt"/>
+                <a:ea typeface="+mn-ea"/>
+                <a:cs typeface="+mn-cs"/>
+              </a:defRPr>
+            </a:lvl3pPr>
+            <a:lvl4pPr marL="457189" indent="-228594" algn="l" defTabSz="914377" rtl="0" eaLnBrk="1" latinLnBrk="0" hangingPunct="1">
+              <a:lnSpc>
+                <a:spcPct val="90000"/>
+              </a:lnSpc>
+              <a:spcBef>
+                <a:spcPts val="600"/>
+              </a:spcBef>
+              <a:buFont typeface="Arial" panose="020B0604020202020204" pitchFamily="34" charset="0"/>
+              <a:buChar char="•"/>
+              <a:defRPr sz="2400" kern="1200">
+                <a:solidFill>
+                  <a:schemeClr val="tx1"/>
+                </a:solidFill>
+                <a:latin typeface="+mn-lt"/>
+                <a:ea typeface="+mn-ea"/>
+                <a:cs typeface="+mn-cs"/>
+              </a:defRPr>
+            </a:lvl4pPr>
+            <a:lvl5pPr marL="690545" indent="-228594" algn="l" defTabSz="914377" rtl="0" eaLnBrk="1" latinLnBrk="0" hangingPunct="1">
+              <a:lnSpc>
+                <a:spcPct val="90000"/>
+              </a:lnSpc>
+              <a:spcBef>
+                <a:spcPts val="600"/>
+              </a:spcBef>
+              <a:buFont typeface="Arial" panose="020B0604020202020204" pitchFamily="34" charset="0"/>
+              <a:buChar char="•"/>
+              <a:defRPr sz="2400" kern="1200">
+                <a:solidFill>
+                  <a:schemeClr val="tx1"/>
+                </a:solidFill>
+                <a:latin typeface="+mn-lt"/>
+                <a:ea typeface="+mn-ea"/>
+                <a:cs typeface="+mn-cs"/>
+              </a:defRPr>
+            </a:lvl5pPr>
+            <a:lvl6pPr marL="2514537" indent="-228594" algn="l" defTabSz="914377" rtl="0" eaLnBrk="1" latinLnBrk="0" hangingPunct="1">
+              <a:lnSpc>
+                <a:spcPct val="90000"/>
+              </a:lnSpc>
+              <a:spcBef>
+                <a:spcPts val="500"/>
+              </a:spcBef>
+              <a:buFont typeface="Arial" panose="020B0604020202020204" pitchFamily="34" charset="0"/>
+              <a:buChar char="•"/>
+              <a:defRPr sz="1867" kern="1200">
+                <a:solidFill>
+                  <a:schemeClr val="tx1"/>
+                </a:solidFill>
+                <a:latin typeface="+mn-lt"/>
+                <a:ea typeface="+mn-ea"/>
+                <a:cs typeface="+mn-cs"/>
+              </a:defRPr>
+            </a:lvl6pPr>
+            <a:lvl7pPr marL="2971726" indent="-228594" algn="l" defTabSz="914377" rtl="0" eaLnBrk="1" latinLnBrk="0" hangingPunct="1">
+              <a:lnSpc>
+                <a:spcPct val="90000"/>
+              </a:lnSpc>
+              <a:spcBef>
+                <a:spcPts val="500"/>
+              </a:spcBef>
+              <a:buFont typeface="Arial" panose="020B0604020202020204" pitchFamily="34" charset="0"/>
+              <a:buChar char="•"/>
+              <a:defRPr sz="1867" kern="1200">
+                <a:solidFill>
+                  <a:schemeClr val="tx1"/>
+                </a:solidFill>
+                <a:latin typeface="+mn-lt"/>
+                <a:ea typeface="+mn-ea"/>
+                <a:cs typeface="+mn-cs"/>
+              </a:defRPr>
+            </a:lvl7pPr>
+            <a:lvl8pPr marL="3428914" indent="-228594" algn="l" defTabSz="914377" rtl="0" eaLnBrk="1" latinLnBrk="0" hangingPunct="1">
+              <a:lnSpc>
+                <a:spcPct val="90000"/>
+              </a:lnSpc>
+              <a:spcBef>
+                <a:spcPts val="500"/>
+              </a:spcBef>
+              <a:buFont typeface="Arial" panose="020B0604020202020204" pitchFamily="34" charset="0"/>
+              <a:buChar char="•"/>
+              <a:defRPr sz="1867" kern="1200">
+                <a:solidFill>
+                  <a:schemeClr val="tx1"/>
+                </a:solidFill>
+                <a:latin typeface="+mn-lt"/>
+                <a:ea typeface="+mn-ea"/>
+                <a:cs typeface="+mn-cs"/>
+              </a:defRPr>
+            </a:lvl8pPr>
+            <a:lvl9pPr marL="3886103" indent="-228594" algn="l" defTabSz="914377" rtl="0" eaLnBrk="1" latinLnBrk="0" hangingPunct="1">
+              <a:lnSpc>
+                <a:spcPct val="90000"/>
+              </a:lnSpc>
+              <a:spcBef>
+                <a:spcPts val="500"/>
+              </a:spcBef>
+              <a:buFont typeface="Arial" panose="020B0604020202020204" pitchFamily="34" charset="0"/>
+              <a:buChar char="•"/>
+              <a:defRPr sz="1867" kern="1200">
+                <a:solidFill>
+                  <a:schemeClr val="tx1"/>
+                </a:solidFill>
+                <a:latin typeface="+mn-lt"/>
+                <a:ea typeface="+mn-ea"/>
+                <a:cs typeface="+mn-cs"/>
+              </a:defRPr>
+            </a:lvl9pPr>
+          </a:lstStyle>
+          <a:p>
+            <a:r>
+              <a:rPr lang="en-US" dirty="0" smtClean="0">
+                <a:solidFill>
+                  <a:schemeClr val="tx1"/>
+                </a:solidFill>
+              </a:rPr>
+              <a:t>Sevilla</a:t>
+            </a:r>
+          </a:p>
+        </p:txBody>
+      </p:sp>
+      <p:sp>
+        <p:nvSpPr>
+          <p:cNvPr id="4" name="TextBox 1"/>
+          <p:cNvSpPr txBox="1"/>
+          <p:nvPr/>
+        </p:nvSpPr>
+        <p:spPr>
+          <a:xfrm rot="20660793">
+            <a:off x="6207828" y="2512761"/>
+            <a:ext cx="5254324" cy="1551194"/>
+          </a:xfrm>
+          <a:prstGeom prst="rect">
+            <a:avLst/>
+          </a:prstGeom>
+          <a:noFill/>
+        </p:spPr>
+        <p:txBody>
+          <a:bodyPr wrap="none" lIns="137160" tIns="109728" rIns="137160" bIns="109728" rtlCol="0">
+            <a:spAutoFit/>
+          </a:bodyPr>
+          <a:lstStyle/>
+          <a:p>
+            <a:pPr>
+              <a:lnSpc>
+                <a:spcPct val="90000"/>
+              </a:lnSpc>
+              <a:spcBef>
+                <a:spcPts val="600"/>
+              </a:spcBef>
+            </a:pPr>
+            <a:r>
+              <a:rPr lang="es-ES" sz="9600" b="1" dirty="0" smtClean="0">
+                <a:latin typeface="+mj-lt"/>
+              </a:rPr>
+              <a:t>¡Gracias!</a:t>
+            </a:r>
+          </a:p>
+        </p:txBody>
+      </p:sp>
+    </p:spTree>
+    <p:extLst>
+      <p:ext uri="{BB962C8B-B14F-4D97-AF65-F5344CB8AC3E}">
+        <p14:creationId xmlns:p14="http://schemas.microsoft.com/office/powerpoint/2010/main" val="461489940"/>
+      </p:ext>
+    </p:extLst>
+  </p:cSld>
+  <p:clrMapOvr>
+    <a:masterClrMapping/>
+  </p:clrMapOvr>
+  <p:transition>
+    <p:fade/>
+  </p:transition>
+  <p:timing>
+    <p:tnLst>
+      <p:par>
+        <p:cTn id="1" dur="indefinite" restart="never" nodeType="tmRoot"/>
+      </p:par>
+    </p:tnLst>
+  </p:timing>
+</p:sld>
+</file>
+
 <file path=ppt/slides/slide2.xml><?xml version="1.0" encoding="utf-8"?>
+<p:sld xmlns:a="http://schemas.openxmlformats.org/drawingml/2006/main" xmlns:r="http://schemas.openxmlformats.org/officeDocument/2006/relationships" xmlns:p="http://schemas.openxmlformats.org/presentationml/2006/main">
+  <p:cSld>
+    <p:spTree>
+      <p:nvGrpSpPr>
+        <p:cNvPr id="1" name=""/>
+        <p:cNvGrpSpPr/>
+        <p:nvPr/>
+      </p:nvGrpSpPr>
+      <p:grpSpPr>
+        <a:xfrm>
+          <a:off x="0" y="0"/>
+          <a:ext cx="0" cy="0"/>
+          <a:chOff x="0" y="0"/>
+          <a:chExt cx="0" cy="0"/>
+        </a:xfrm>
+      </p:grpSpPr>
+      <p:sp>
+        <p:nvSpPr>
+          <p:cNvPr id="3" name="Title 2"/>
+          <p:cNvSpPr txBox="1">
+            <a:spLocks/>
+          </p:cNvSpPr>
+          <p:nvPr/>
+        </p:nvSpPr>
+        <p:spPr>
+          <a:xfrm>
+            <a:off x="720342" y="-43125"/>
+            <a:ext cx="10751313" cy="1614797"/>
+          </a:xfrm>
+          <a:prstGeom prst="rect">
+            <a:avLst/>
+          </a:prstGeom>
+        </p:spPr>
+        <p:txBody>
+          <a:bodyPr/>
+          <a:lstStyle>
+            <a:lvl1pPr algn="l" defTabSz="914377" rtl="0" eaLnBrk="1" latinLnBrk="0" hangingPunct="1">
+              <a:lnSpc>
+                <a:spcPct val="90000"/>
+              </a:lnSpc>
+              <a:spcBef>
+                <a:spcPct val="0"/>
+              </a:spcBef>
+              <a:buNone/>
+              <a:defRPr sz="4800" b="1" kern="1200">
+                <a:solidFill>
+                  <a:schemeClr val="accent1"/>
+                </a:solidFill>
+                <a:latin typeface="+mj-lt"/>
+                <a:ea typeface="+mj-ea"/>
+                <a:cs typeface="+mj-cs"/>
+              </a:defRPr>
+            </a:lvl1pPr>
+          </a:lstStyle>
+          <a:p>
+            <a:r>
+              <a:rPr lang="en-US" dirty="0" smtClean="0">
+                <a:solidFill>
+                  <a:schemeClr val="tx1"/>
+                </a:solidFill>
+              </a:rPr>
+              <a:t>Antes de </a:t>
+            </a:r>
+            <a:r>
+              <a:rPr lang="en-US" dirty="0" err="1" smtClean="0">
+                <a:solidFill>
+                  <a:schemeClr val="tx1"/>
+                </a:solidFill>
+              </a:rPr>
+              <a:t>empezar</a:t>
+            </a:r>
+            <a:r>
+              <a:rPr lang="en-US" dirty="0" smtClean="0">
+                <a:solidFill>
+                  <a:schemeClr val="tx1"/>
+                </a:solidFill>
+              </a:rPr>
+              <a:t>…</a:t>
+            </a:r>
+            <a:endParaRPr lang="en-US" dirty="0">
+              <a:solidFill>
+                <a:schemeClr val="tx1"/>
+              </a:solidFill>
+            </a:endParaRPr>
+          </a:p>
+        </p:txBody>
+      </p:sp>
+      <p:sp>
+        <p:nvSpPr>
+          <p:cNvPr id="5" name="Subtitle 1"/>
+          <p:cNvSpPr txBox="1">
+            <a:spLocks/>
+          </p:cNvSpPr>
+          <p:nvPr/>
+        </p:nvSpPr>
+        <p:spPr>
+          <a:xfrm>
+            <a:off x="720342" y="587147"/>
+            <a:ext cx="11471658" cy="5082138"/>
+          </a:xfrm>
+          <a:prstGeom prst="rect">
+            <a:avLst/>
+          </a:prstGeom>
+        </p:spPr>
+        <p:txBody>
+          <a:bodyPr/>
+          <a:lstStyle>
+            <a:lvl1pPr marL="0" indent="0" algn="l" defTabSz="914377" rtl="0" eaLnBrk="1" latinLnBrk="0" hangingPunct="1">
+              <a:lnSpc>
+                <a:spcPct val="90000"/>
+              </a:lnSpc>
+              <a:spcBef>
+                <a:spcPts val="2400"/>
+              </a:spcBef>
+              <a:buFont typeface="Arial" panose="020B0604020202020204" pitchFamily="34" charset="0"/>
+              <a:buNone/>
+              <a:defRPr sz="3733" b="0" kern="1200">
+                <a:solidFill>
+                  <a:schemeClr val="accent1"/>
+                </a:solidFill>
+                <a:latin typeface="+mj-lt"/>
+                <a:ea typeface="+mn-ea"/>
+                <a:cs typeface="+mn-cs"/>
+              </a:defRPr>
+            </a:lvl1pPr>
+            <a:lvl2pPr marL="0" indent="0" algn="l" defTabSz="914377" rtl="0" eaLnBrk="1" latinLnBrk="0" hangingPunct="1">
+              <a:lnSpc>
+                <a:spcPct val="90000"/>
+              </a:lnSpc>
+              <a:spcBef>
+                <a:spcPts val="600"/>
+              </a:spcBef>
+              <a:buFont typeface="Arial" panose="020B0604020202020204" pitchFamily="34" charset="0"/>
+              <a:buNone/>
+              <a:defRPr sz="2400" kern="1200">
+                <a:solidFill>
+                  <a:schemeClr val="tx1"/>
+                </a:solidFill>
+                <a:latin typeface="+mn-lt"/>
+                <a:ea typeface="+mn-ea"/>
+                <a:cs typeface="+mn-cs"/>
+              </a:defRPr>
+            </a:lvl2pPr>
+            <a:lvl3pPr marL="233357" indent="-228594" algn="l" defTabSz="914377" rtl="0" eaLnBrk="1" latinLnBrk="0" hangingPunct="1">
+              <a:lnSpc>
+                <a:spcPct val="90000"/>
+              </a:lnSpc>
+              <a:spcBef>
+                <a:spcPts val="600"/>
+              </a:spcBef>
+              <a:buFont typeface="Arial" panose="020B0604020202020204" pitchFamily="34" charset="0"/>
+              <a:buChar char="•"/>
+              <a:defRPr sz="2400" kern="1200">
+                <a:solidFill>
+                  <a:schemeClr val="tx1"/>
+                </a:solidFill>
+                <a:latin typeface="+mn-lt"/>
+                <a:ea typeface="+mn-ea"/>
+                <a:cs typeface="+mn-cs"/>
+              </a:defRPr>
+            </a:lvl3pPr>
+            <a:lvl4pPr marL="457189" indent="-228594" algn="l" defTabSz="914377" rtl="0" eaLnBrk="1" latinLnBrk="0" hangingPunct="1">
+              <a:lnSpc>
+                <a:spcPct val="90000"/>
+              </a:lnSpc>
+              <a:spcBef>
+                <a:spcPts val="600"/>
+              </a:spcBef>
+              <a:buFont typeface="Arial" panose="020B0604020202020204" pitchFamily="34" charset="0"/>
+              <a:buChar char="•"/>
+              <a:defRPr sz="2400" kern="1200">
+                <a:solidFill>
+                  <a:schemeClr val="tx1"/>
+                </a:solidFill>
+                <a:latin typeface="+mn-lt"/>
+                <a:ea typeface="+mn-ea"/>
+                <a:cs typeface="+mn-cs"/>
+              </a:defRPr>
+            </a:lvl4pPr>
+            <a:lvl5pPr marL="690545" indent="-228594" algn="l" defTabSz="914377" rtl="0" eaLnBrk="1" latinLnBrk="0" hangingPunct="1">
+              <a:lnSpc>
+                <a:spcPct val="90000"/>
+              </a:lnSpc>
+              <a:spcBef>
+                <a:spcPts val="600"/>
+              </a:spcBef>
+              <a:buFont typeface="Arial" panose="020B0604020202020204" pitchFamily="34" charset="0"/>
+              <a:buChar char="•"/>
+              <a:defRPr sz="2400" kern="1200">
+                <a:solidFill>
+                  <a:schemeClr val="tx1"/>
+                </a:solidFill>
+                <a:latin typeface="+mn-lt"/>
+                <a:ea typeface="+mn-ea"/>
+                <a:cs typeface="+mn-cs"/>
+              </a:defRPr>
+            </a:lvl5pPr>
+            <a:lvl6pPr marL="2514537" indent="-228594" algn="l" defTabSz="914377" rtl="0" eaLnBrk="1" latinLnBrk="0" hangingPunct="1">
+              <a:lnSpc>
+                <a:spcPct val="90000"/>
+              </a:lnSpc>
+              <a:spcBef>
+                <a:spcPts val="500"/>
+              </a:spcBef>
+              <a:buFont typeface="Arial" panose="020B0604020202020204" pitchFamily="34" charset="0"/>
+              <a:buChar char="•"/>
+              <a:defRPr sz="1867" kern="1200">
+                <a:solidFill>
+                  <a:schemeClr val="tx1"/>
+                </a:solidFill>
+                <a:latin typeface="+mn-lt"/>
+                <a:ea typeface="+mn-ea"/>
+                <a:cs typeface="+mn-cs"/>
+              </a:defRPr>
+            </a:lvl6pPr>
+            <a:lvl7pPr marL="2971726" indent="-228594" algn="l" defTabSz="914377" rtl="0" eaLnBrk="1" latinLnBrk="0" hangingPunct="1">
+              <a:lnSpc>
+                <a:spcPct val="90000"/>
+              </a:lnSpc>
+              <a:spcBef>
+                <a:spcPts val="500"/>
+              </a:spcBef>
+              <a:buFont typeface="Arial" panose="020B0604020202020204" pitchFamily="34" charset="0"/>
+              <a:buChar char="•"/>
+              <a:defRPr sz="1867" kern="1200">
+                <a:solidFill>
+                  <a:schemeClr val="tx1"/>
+                </a:solidFill>
+                <a:latin typeface="+mn-lt"/>
+                <a:ea typeface="+mn-ea"/>
+                <a:cs typeface="+mn-cs"/>
+              </a:defRPr>
+            </a:lvl7pPr>
+            <a:lvl8pPr marL="3428914" indent="-228594" algn="l" defTabSz="914377" rtl="0" eaLnBrk="1" latinLnBrk="0" hangingPunct="1">
+              <a:lnSpc>
+                <a:spcPct val="90000"/>
+              </a:lnSpc>
+              <a:spcBef>
+                <a:spcPts val="500"/>
+              </a:spcBef>
+              <a:buFont typeface="Arial" panose="020B0604020202020204" pitchFamily="34" charset="0"/>
+              <a:buChar char="•"/>
+              <a:defRPr sz="1867" kern="1200">
+                <a:solidFill>
+                  <a:schemeClr val="tx1"/>
+                </a:solidFill>
+                <a:latin typeface="+mn-lt"/>
+                <a:ea typeface="+mn-ea"/>
+                <a:cs typeface="+mn-cs"/>
+              </a:defRPr>
+            </a:lvl8pPr>
+            <a:lvl9pPr marL="3886103" indent="-228594" algn="l" defTabSz="914377" rtl="0" eaLnBrk="1" latinLnBrk="0" hangingPunct="1">
+              <a:lnSpc>
+                <a:spcPct val="90000"/>
+              </a:lnSpc>
+              <a:spcBef>
+                <a:spcPts val="500"/>
+              </a:spcBef>
+              <a:buFont typeface="Arial" panose="020B0604020202020204" pitchFamily="34" charset="0"/>
+              <a:buChar char="•"/>
+              <a:defRPr sz="1867" kern="1200">
+                <a:solidFill>
+                  <a:schemeClr val="tx1"/>
+                </a:solidFill>
+                <a:latin typeface="+mn-lt"/>
+                <a:ea typeface="+mn-ea"/>
+                <a:cs typeface="+mn-cs"/>
+              </a:defRPr>
+            </a:lvl9pPr>
+          </a:lstStyle>
+          <a:p>
+            <a:r>
+              <a:rPr lang="en-US" sz="1800" dirty="0" smtClean="0">
+                <a:solidFill>
+                  <a:schemeClr val="accent1">
+                    <a:lumMod val="20000"/>
+                    <a:lumOff val="80000"/>
+                  </a:schemeClr>
+                </a:solidFill>
+              </a:rPr>
+              <a:t>¿</a:t>
+            </a:r>
+            <a:r>
+              <a:rPr lang="en-US" sz="1800" dirty="0" err="1" smtClean="0">
+                <a:solidFill>
+                  <a:schemeClr val="accent1">
+                    <a:lumMod val="20000"/>
+                    <a:lumOff val="80000"/>
+                  </a:schemeClr>
+                </a:solidFill>
+              </a:rPr>
+              <a:t>Nos</a:t>
+            </a:r>
+            <a:r>
+              <a:rPr lang="en-US" sz="1800" dirty="0" smtClean="0">
+                <a:solidFill>
+                  <a:schemeClr val="accent1">
+                    <a:lumMod val="20000"/>
+                    <a:lumOff val="80000"/>
+                  </a:schemeClr>
+                </a:solidFill>
+              </a:rPr>
+              <a:t> </a:t>
+            </a:r>
+            <a:r>
+              <a:rPr lang="en-US" sz="1800" dirty="0" err="1" smtClean="0">
+                <a:solidFill>
+                  <a:schemeClr val="accent1">
+                    <a:lumMod val="20000"/>
+                    <a:lumOff val="80000"/>
+                  </a:schemeClr>
+                </a:solidFill>
+              </a:rPr>
+              <a:t>conoces</a:t>
+            </a:r>
+            <a:r>
+              <a:rPr lang="en-US" sz="1800" dirty="0" smtClean="0">
+                <a:solidFill>
+                  <a:schemeClr val="accent1">
+                    <a:lumMod val="20000"/>
+                    <a:lumOff val="80000"/>
+                  </a:schemeClr>
+                </a:solidFill>
+              </a:rPr>
+              <a:t>?</a:t>
+            </a:r>
+            <a:endParaRPr lang="en-US" sz="3200" b="1" dirty="0" smtClean="0">
+              <a:solidFill>
+                <a:schemeClr val="tx1"/>
+              </a:solidFill>
+            </a:endParaRPr>
+          </a:p>
+          <a:p>
+            <a:pPr marL="457200" indent="-457200">
+              <a:buFont typeface="Arial" panose="020B0604020202020204" pitchFamily="34" charset="0"/>
+              <a:buChar char="•"/>
+            </a:pPr>
+            <a:r>
+              <a:rPr lang="en-US" sz="3200" b="1" dirty="0" smtClean="0">
+                <a:solidFill>
+                  <a:schemeClr val="tx1"/>
+                </a:solidFill>
+              </a:rPr>
+              <a:t>CartujaDotNet</a:t>
+            </a:r>
+            <a:r>
+              <a:rPr lang="en-US" sz="3200" dirty="0" smtClean="0">
+                <a:solidFill>
+                  <a:schemeClr val="accent1">
+                    <a:lumMod val="20000"/>
+                    <a:lumOff val="80000"/>
+                  </a:schemeClr>
+                </a:solidFill>
+              </a:rPr>
+              <a:t>: @CartujaDotNet - CartujaDotNet.es</a:t>
+            </a:r>
+          </a:p>
+          <a:p>
+            <a:pPr marL="457200" indent="-457200">
+              <a:buFont typeface="Arial" panose="020B0604020202020204" pitchFamily="34" charset="0"/>
+              <a:buChar char="•"/>
+            </a:pPr>
+            <a:endParaRPr lang="en-US" sz="3200" dirty="0" smtClean="0">
+              <a:solidFill>
+                <a:schemeClr val="accent1">
+                  <a:lumMod val="20000"/>
+                  <a:lumOff val="80000"/>
+                </a:schemeClr>
+              </a:solidFill>
+            </a:endParaRPr>
+          </a:p>
+          <a:p>
+            <a:pPr marL="457200" indent="-457200">
+              <a:buFont typeface="Arial" panose="020B0604020202020204" pitchFamily="34" charset="0"/>
+              <a:buChar char="•"/>
+            </a:pPr>
+            <a:r>
+              <a:rPr lang="en-US" sz="3200" b="1" dirty="0" smtClean="0">
+                <a:solidFill>
+                  <a:schemeClr val="tx1"/>
+                </a:solidFill>
+              </a:rPr>
+              <a:t>WPSUG</a:t>
+            </a:r>
+            <a:r>
+              <a:rPr lang="en-US" sz="3200" dirty="0" smtClean="0">
+                <a:solidFill>
+                  <a:schemeClr val="accent1">
+                    <a:lumMod val="20000"/>
+                    <a:lumOff val="80000"/>
+                  </a:schemeClr>
+                </a:solidFill>
+              </a:rPr>
+              <a:t>: @WPSUG - WPSUG.net</a:t>
+            </a:r>
+          </a:p>
+          <a:p>
+            <a:pPr marL="457200" indent="-457200">
+              <a:buFont typeface="Arial" panose="020B0604020202020204" pitchFamily="34" charset="0"/>
+              <a:buChar char="•"/>
+            </a:pPr>
+            <a:endParaRPr lang="en-US" sz="3200" dirty="0" smtClean="0">
+              <a:solidFill>
+                <a:schemeClr val="accent1">
+                  <a:lumMod val="20000"/>
+                  <a:lumOff val="80000"/>
+                </a:schemeClr>
+              </a:solidFill>
+            </a:endParaRPr>
+          </a:p>
+          <a:p>
+            <a:pPr marL="457200" indent="-457200">
+              <a:buFont typeface="Arial" panose="020B0604020202020204" pitchFamily="34" charset="0"/>
+              <a:buChar char="•"/>
+            </a:pPr>
+            <a:r>
+              <a:rPr lang="en-US" sz="3200" b="1" dirty="0" smtClean="0">
+                <a:solidFill>
+                  <a:schemeClr val="accent1">
+                    <a:lumMod val="20000"/>
+                    <a:lumOff val="80000"/>
+                  </a:schemeClr>
+                </a:solidFill>
+              </a:rPr>
+              <a:t>SVQXDG</a:t>
+            </a:r>
+            <a:r>
+              <a:rPr lang="en-US" sz="3200" dirty="0" smtClean="0">
+                <a:solidFill>
+                  <a:schemeClr val="accent1">
+                    <a:lumMod val="20000"/>
+                    <a:lumOff val="80000"/>
+                  </a:schemeClr>
+                </a:solidFill>
+              </a:rPr>
+              <a:t>: @SVQXDG - meetup.com/</a:t>
+            </a:r>
+            <a:r>
+              <a:rPr lang="en-US" sz="3200" dirty="0" err="1" smtClean="0">
+                <a:solidFill>
+                  <a:schemeClr val="accent1">
+                    <a:lumMod val="20000"/>
+                    <a:lumOff val="80000"/>
+                  </a:schemeClr>
+                </a:solidFill>
+              </a:rPr>
+              <a:t>sevillaxamarindevelopers</a:t>
+            </a:r>
+            <a:endParaRPr lang="en-US" sz="3200" dirty="0" smtClean="0">
+              <a:solidFill>
+                <a:schemeClr val="accent1">
+                  <a:lumMod val="20000"/>
+                  <a:lumOff val="80000"/>
+                </a:schemeClr>
+              </a:solidFill>
+            </a:endParaRPr>
+          </a:p>
+          <a:p>
+            <a:pPr marL="571500" indent="-571500">
+              <a:buFont typeface="Arial" panose="020B0604020202020204" pitchFamily="34" charset="0"/>
+              <a:buChar char="•"/>
+            </a:pPr>
+            <a:endParaRPr lang="en-US" dirty="0">
+              <a:solidFill>
+                <a:schemeClr val="bg1">
+                  <a:lumMod val="40000"/>
+                  <a:lumOff val="60000"/>
+                </a:schemeClr>
+              </a:solidFill>
+            </a:endParaRPr>
+          </a:p>
+        </p:txBody>
+      </p:sp>
+      <p:pic>
+        <p:nvPicPr>
+          <p:cNvPr id="4" name="Picture 3"/>
+          <p:cNvPicPr>
+            <a:picLocks noChangeAspect="1"/>
+          </p:cNvPicPr>
+          <p:nvPr/>
+        </p:nvPicPr>
+        <p:blipFill>
+          <a:blip r:embed="rId2">
+            <a:extLst>
+              <a:ext uri="{28A0092B-C50C-407E-A947-70E740481C1C}">
+                <a14:useLocalDpi xmlns:a14="http://schemas.microsoft.com/office/drawing/2010/main" val="0"/>
+              </a:ext>
+            </a:extLst>
+          </a:blip>
+          <a:stretch>
+            <a:fillRect/>
+          </a:stretch>
+        </p:blipFill>
+        <p:spPr>
+          <a:xfrm>
+            <a:off x="5933199" y="6516302"/>
+            <a:ext cx="1045944" cy="312296"/>
+          </a:xfrm>
+          <a:prstGeom prst="rect">
+            <a:avLst/>
+          </a:prstGeom>
+        </p:spPr>
+      </p:pic>
+      <p:pic>
+        <p:nvPicPr>
+          <p:cNvPr id="6" name="Picture 5"/>
+          <p:cNvPicPr>
+            <a:picLocks noChangeAspect="1"/>
+          </p:cNvPicPr>
+          <p:nvPr/>
+        </p:nvPicPr>
+        <p:blipFill>
+          <a:blip r:embed="rId3" cstate="print">
+            <a:extLst>
+              <a:ext uri="{28A0092B-C50C-407E-A947-70E740481C1C}">
+                <a14:useLocalDpi xmlns:a14="http://schemas.microsoft.com/office/drawing/2010/main" val="0"/>
+              </a:ext>
+            </a:extLst>
+          </a:blip>
+          <a:stretch>
+            <a:fillRect/>
+          </a:stretch>
+        </p:blipFill>
+        <p:spPr>
+          <a:xfrm>
+            <a:off x="7108598" y="6512966"/>
+            <a:ext cx="773010" cy="312296"/>
+          </a:xfrm>
+          <a:prstGeom prst="rect">
+            <a:avLst/>
+          </a:prstGeom>
+        </p:spPr>
+      </p:pic>
+      <p:pic>
+        <p:nvPicPr>
+          <p:cNvPr id="7" name="Picture 6"/>
+          <p:cNvPicPr>
+            <a:picLocks noChangeAspect="1"/>
+          </p:cNvPicPr>
+          <p:nvPr/>
+        </p:nvPicPr>
+        <p:blipFill>
+          <a:blip r:embed="rId4" cstate="print">
+            <a:extLst>
+              <a:ext uri="{28A0092B-C50C-407E-A947-70E740481C1C}">
+                <a14:useLocalDpi xmlns:a14="http://schemas.microsoft.com/office/drawing/2010/main" val="0"/>
+              </a:ext>
+            </a:extLst>
+          </a:blip>
+          <a:stretch>
+            <a:fillRect/>
+          </a:stretch>
+        </p:blipFill>
+        <p:spPr>
+          <a:xfrm>
+            <a:off x="5038486" y="6512966"/>
+            <a:ext cx="765258" cy="315631"/>
+          </a:xfrm>
+          <a:prstGeom prst="rect">
+            <a:avLst/>
+          </a:prstGeom>
+        </p:spPr>
+      </p:pic>
+    </p:spTree>
+    <p:extLst>
+      <p:ext uri="{BB962C8B-B14F-4D97-AF65-F5344CB8AC3E}">
+        <p14:creationId xmlns:p14="http://schemas.microsoft.com/office/powerpoint/2010/main" val="2760425320"/>
+      </p:ext>
+    </p:extLst>
+  </p:cSld>
+  <p:clrMapOvr>
+    <a:masterClrMapping/>
+  </p:clrMapOvr>
+  <p:transition>
+    <p:fade/>
+  </p:transition>
+  <p:timing>
+    <p:tnLst>
+      <p:par>
+        <p:cTn id="1" dur="indefinite" restart="never" nodeType="tmRoot"/>
+      </p:par>
+    </p:tnLst>
+  </p:timing>
+</p:sld>
+</file>
+
+<file path=ppt/slides/slide3.xml><?xml version="1.0" encoding="utf-8"?>
 <p:sld xmlns:a="http://schemas.openxmlformats.org/drawingml/2006/main" xmlns:r="http://schemas.openxmlformats.org/officeDocument/2006/relationships" xmlns:p="http://schemas.openxmlformats.org/presentationml/2006/main">
   <p:cSld>
     <p:spTree>
@@ -27014,14 +27926,14 @@
           <a:effectLst/>
           <a:extLst>
             <a:ext uri="{909E8E84-426E-40dd-AFC4-6F175D3DCCD1}">
-              <a14:hiddenFill xmlns="" xmlns:a14="http://schemas.microsoft.com/office/drawing/2010/main">
+              <a14:hiddenFill xmlns:a14="http://schemas.microsoft.com/office/drawing/2010/main" xmlns="">
                 <a:solidFill>
                   <a:schemeClr val="accent1"/>
                 </a:solidFill>
               </a14:hiddenFill>
             </a:ext>
             <a:ext uri="{91240B29-F687-4f45-9708-019B960494DF}">
-              <a14:hiddenLine xmlns="" xmlns:a14="http://schemas.microsoft.com/office/drawing/2010/main" w="9525">
+              <a14:hiddenLine xmlns:a14="http://schemas.microsoft.com/office/drawing/2010/main" xmlns="" w="9525">
                 <a:solidFill>
                   <a:schemeClr val="tx1"/>
                 </a:solidFill>
@@ -27031,7 +27943,7 @@
               </a14:hiddenLine>
             </a:ext>
             <a:ext uri="{AF507438-7753-43e0-B8FC-AC1667EBCBE1}">
-              <a14:hiddenEffects xmlns="" xmlns:a14="http://schemas.microsoft.com/office/drawing/2010/main">
+              <a14:hiddenEffects xmlns:a14="http://schemas.microsoft.com/office/drawing/2010/main" xmlns="">
                 <a:effectLst>
                   <a:outerShdw dist="35921" dir="2700000" algn="ctr" rotWithShape="0">
                     <a:schemeClr val="bg2"/>
@@ -27052,11 +27964,11 @@
   <p:clrMapOvr>
     <a:masterClrMapping/>
   </p:clrMapOvr>
-  <mc:AlternateContent xmlns:mc="http://schemas.openxmlformats.org/markup-compatibility/2006">
-    <mc:Choice xmlns:p14="http://schemas.microsoft.com/office/powerpoint/2010/main" Requires="p14">
+  <mc:AlternateContent xmlns:mc="http://schemas.openxmlformats.org/markup-compatibility/2006" xmlns:p14="http://schemas.microsoft.com/office/powerpoint/2010/main">
+    <mc:Choice Requires="p14">
       <p:transition p14:dur="0"/>
     </mc:Choice>
-    <mc:Fallback>
+    <mc:Fallback xmlns="">
       <p:transition/>
     </mc:Fallback>
   </mc:AlternateContent>
@@ -27070,7 +27982,7 @@
 </p:sld>
 </file>
 
-<file path=ppt/slides/slide3.xml><?xml version="1.0" encoding="utf-8"?>
+<file path=ppt/slides/slide4.xml><?xml version="1.0" encoding="utf-8"?>
 <p:sld xmlns:a="http://schemas.openxmlformats.org/drawingml/2006/main" xmlns:r="http://schemas.openxmlformats.org/officeDocument/2006/relationships" xmlns:p="http://schemas.openxmlformats.org/presentationml/2006/main">
   <p:cSld>
     <p:spTree>
@@ -27171,11 +28083,11 @@
   <p:clrMapOvr>
     <a:masterClrMapping/>
   </p:clrMapOvr>
-  <mc:AlternateContent xmlns:mc="http://schemas.openxmlformats.org/markup-compatibility/2006">
-    <mc:Choice xmlns:p14="http://schemas.microsoft.com/office/powerpoint/2010/main" Requires="p14">
+  <mc:AlternateContent xmlns:mc="http://schemas.openxmlformats.org/markup-compatibility/2006" xmlns:p14="http://schemas.microsoft.com/office/powerpoint/2010/main">
+    <mc:Choice Requires="p14">
       <p:transition p14:dur="0"/>
     </mc:Choice>
-    <mc:Fallback>
+    <mc:Fallback xmlns="">
       <p:transition/>
     </mc:Fallback>
   </mc:AlternateContent>
@@ -27189,7 +28101,7 @@
 </p:sld>
 </file>
 
-<file path=ppt/slides/slide4.xml><?xml version="1.0" encoding="utf-8"?>
+<file path=ppt/slides/slide5.xml><?xml version="1.0" encoding="utf-8"?>
 <p:sld xmlns:a="http://schemas.openxmlformats.org/drawingml/2006/main" xmlns:r="http://schemas.openxmlformats.org/officeDocument/2006/relationships" xmlns:p="http://schemas.openxmlformats.org/presentationml/2006/main">
   <p:cSld>
     <p:spTree>
@@ -27382,11 +28294,11 @@
   <p:clrMapOvr>
     <a:masterClrMapping/>
   </p:clrMapOvr>
-  <mc:AlternateContent xmlns:mc="http://schemas.openxmlformats.org/markup-compatibility/2006">
-    <mc:Choice xmlns:p14="http://schemas.microsoft.com/office/powerpoint/2010/main" Requires="p14">
+  <mc:AlternateContent xmlns:mc="http://schemas.openxmlformats.org/markup-compatibility/2006" xmlns:p14="http://schemas.microsoft.com/office/powerpoint/2010/main">
+    <mc:Choice Requires="p14">
       <p:transition p14:dur="0"/>
     </mc:Choice>
-    <mc:Fallback>
+    <mc:Fallback xmlns="">
       <p:transition/>
     </mc:Fallback>
   </mc:AlternateContent>
@@ -27400,7 +28312,7 @@
 </p:sld>
 </file>
 
-<file path=ppt/slides/slide5.xml><?xml version="1.0" encoding="utf-8"?>
+<file path=ppt/slides/slide6.xml><?xml version="1.0" encoding="utf-8"?>
 <p:sld xmlns:a="http://schemas.openxmlformats.org/drawingml/2006/main" xmlns:r="http://schemas.openxmlformats.org/officeDocument/2006/relationships" xmlns:p="http://schemas.openxmlformats.org/presentationml/2006/main">
   <p:cSld>
     <p:spTree>
@@ -27543,11 +28455,11 @@
   <p:clrMapOvr>
     <a:masterClrMapping/>
   </p:clrMapOvr>
-  <mc:AlternateContent xmlns:mc="http://schemas.openxmlformats.org/markup-compatibility/2006">
-    <mc:Choice xmlns:p14="http://schemas.microsoft.com/office/powerpoint/2010/main" Requires="p14">
+  <mc:AlternateContent xmlns:mc="http://schemas.openxmlformats.org/markup-compatibility/2006" xmlns:p14="http://schemas.microsoft.com/office/powerpoint/2010/main">
+    <mc:Choice Requires="p14">
       <p:transition p14:dur="0"/>
     </mc:Choice>
-    <mc:Fallback>
+    <mc:Fallback xmlns="">
       <p:transition/>
     </mc:Fallback>
   </mc:AlternateContent>
@@ -27686,7 +28598,7 @@
 </p:sld>
 </file>
 
-<file path=ppt/slides/slide6.xml><?xml version="1.0" encoding="utf-8"?>
+<file path=ppt/slides/slide7.xml><?xml version="1.0" encoding="utf-8"?>
 <p:sld xmlns:a="http://schemas.openxmlformats.org/drawingml/2006/main" xmlns:r="http://schemas.openxmlformats.org/officeDocument/2006/relationships" xmlns:p="http://schemas.openxmlformats.org/presentationml/2006/main">
   <p:cSld>
     <p:spTree>
@@ -27727,7 +28639,6 @@
               <a:rPr lang="en-GB" sz="5400" dirty="0"/>
               <a:t>Hashtag</a:t>
             </a:r>
-            <a:endParaRPr lang="en-GB" sz="5400" dirty="0"/>
           </a:p>
         </p:txBody>
       </p:sp>
@@ -27771,11 +28682,11 @@
   <p:clrMapOvr>
     <a:masterClrMapping/>
   </p:clrMapOvr>
-  <mc:AlternateContent xmlns:mc="http://schemas.openxmlformats.org/markup-compatibility/2006">
-    <mc:Choice xmlns:p14="http://schemas.microsoft.com/office/powerpoint/2010/main" Requires="p14">
+  <mc:AlternateContent xmlns:mc="http://schemas.openxmlformats.org/markup-compatibility/2006" xmlns:p14="http://schemas.microsoft.com/office/powerpoint/2010/main">
+    <mc:Choice Requires="p14">
       <p:transition p14:dur="0"/>
     </mc:Choice>
-    <mc:Fallback>
+    <mc:Fallback xmlns="">
       <p:transition/>
     </mc:Fallback>
   </mc:AlternateContent>
@@ -27940,7 +28851,7 @@
 </p:sld>
 </file>
 
-<file path=ppt/slides/slide7.xml><?xml version="1.0" encoding="utf-8"?>
+<file path=ppt/slides/slide8.xml><?xml version="1.0" encoding="utf-8"?>
 <p:sld xmlns:a="http://schemas.openxmlformats.org/drawingml/2006/main" xmlns:r="http://schemas.openxmlformats.org/officeDocument/2006/relationships" xmlns:p="http://schemas.openxmlformats.org/presentationml/2006/main">
   <p:cSld>
     <p:spTree>
@@ -28033,6 +28944,30 @@
           <a:xfrm>
             <a:off x="3399479" y="3163324"/>
             <a:ext cx="4755895" cy="1521887"/>
+          </a:xfrm>
+          <a:prstGeom prst="rect">
+            <a:avLst/>
+          </a:prstGeom>
+        </p:spPr>
+      </p:pic>
+      <p:pic>
+        <p:nvPicPr>
+          <p:cNvPr id="3" name="Imagen 2"/>
+          <p:cNvPicPr>
+            <a:picLocks noChangeAspect="1"/>
+          </p:cNvPicPr>
+          <p:nvPr/>
+        </p:nvPicPr>
+        <p:blipFill>
+          <a:blip r:embed="rId5"/>
+          <a:stretch>
+            <a:fillRect/>
+          </a:stretch>
+        </p:blipFill>
+        <p:spPr>
+          <a:xfrm>
+            <a:off x="3525038" y="4589522"/>
+            <a:ext cx="4545868" cy="1349723"/>
           </a:xfrm>
           <a:prstGeom prst="rect">
             <a:avLst/>
@@ -28261,7 +29196,7 @@
 </p:sld>
 </file>
 
-<file path=ppt/slides/slide8.xml><?xml version="1.0" encoding="utf-8"?>
+<file path=ppt/slides/slide9.xml><?xml version="1.0" encoding="utf-8"?>
 <p:sld xmlns:a="http://schemas.openxmlformats.org/drawingml/2006/main" xmlns:r="http://schemas.openxmlformats.org/officeDocument/2006/relationships" xmlns:p="http://schemas.openxmlformats.org/presentationml/2006/main">
   <p:cSld>
     <p:spTree>
@@ -28578,309 +29513,14 @@
   <p:clrMapOvr>
     <a:masterClrMapping/>
   </p:clrMapOvr>
-  <mc:AlternateContent xmlns:mc="http://schemas.openxmlformats.org/markup-compatibility/2006">
-    <mc:Choice xmlns:p14="http://schemas.microsoft.com/office/powerpoint/2010/main" Requires="p14">
+  <mc:AlternateContent xmlns:mc="http://schemas.openxmlformats.org/markup-compatibility/2006" xmlns:p14="http://schemas.microsoft.com/office/powerpoint/2010/main">
+    <mc:Choice Requires="p14">
       <p:transition p14:dur="0"/>
     </mc:Choice>
-    <mc:Fallback>
+    <mc:Fallback xmlns="">
       <p:transition/>
     </mc:Fallback>
   </mc:AlternateContent>
-  <p:timing>
-    <p:tnLst>
-      <p:par>
-        <p:cTn id="1" dur="indefinite" restart="never" nodeType="tmRoot"/>
-      </p:par>
-    </p:tnLst>
-  </p:timing>
-</p:sld>
-</file>
-
-<file path=ppt/slides/slide9.xml><?xml version="1.0" encoding="utf-8"?>
-<p:sld xmlns:a="http://schemas.openxmlformats.org/drawingml/2006/main" xmlns:r="http://schemas.openxmlformats.org/officeDocument/2006/relationships" xmlns:p="http://schemas.openxmlformats.org/presentationml/2006/main">
-  <p:cSld>
-    <p:spTree>
-      <p:nvGrpSpPr>
-        <p:cNvPr id="1" name=""/>
-        <p:cNvGrpSpPr/>
-        <p:nvPr/>
-      </p:nvGrpSpPr>
-      <p:grpSpPr>
-        <a:xfrm>
-          <a:off x="0" y="0"/>
-          <a:ext cx="0" cy="0"/>
-          <a:chOff x="0" y="0"/>
-          <a:chExt cx="0" cy="0"/>
-        </a:xfrm>
-      </p:grpSpPr>
-      <p:sp>
-        <p:nvSpPr>
-          <p:cNvPr id="3" name="Title 2"/>
-          <p:cNvSpPr txBox="1">
-            <a:spLocks/>
-          </p:cNvSpPr>
-          <p:nvPr/>
-        </p:nvSpPr>
-        <p:spPr>
-          <a:xfrm>
-            <a:off x="720342" y="736517"/>
-            <a:ext cx="10751313" cy="1614797"/>
-          </a:xfrm>
-          <a:prstGeom prst="rect">
-            <a:avLst/>
-          </a:prstGeom>
-        </p:spPr>
-        <p:txBody>
-          <a:bodyPr/>
-          <a:lstStyle>
-            <a:lvl1pPr algn="l" defTabSz="914377" rtl="0" eaLnBrk="1" latinLnBrk="0" hangingPunct="1">
-              <a:lnSpc>
-                <a:spcPct val="90000"/>
-              </a:lnSpc>
-              <a:spcBef>
-                <a:spcPct val="0"/>
-              </a:spcBef>
-              <a:buNone/>
-              <a:defRPr sz="4800" b="1" kern="1200">
-                <a:solidFill>
-                  <a:schemeClr val="accent1"/>
-                </a:solidFill>
-                <a:latin typeface="+mj-lt"/>
-                <a:ea typeface="+mj-ea"/>
-                <a:cs typeface="+mj-cs"/>
-              </a:defRPr>
-            </a:lvl1pPr>
-          </a:lstStyle>
-          <a:p>
-            <a:r>
-              <a:rPr lang="en-US" sz="7200" dirty="0" smtClean="0">
-                <a:solidFill>
-                  <a:schemeClr val="tx1"/>
-                </a:solidFill>
-              </a:rPr>
-              <a:t>Windows 10 Game Jam</a:t>
-            </a:r>
-            <a:endParaRPr lang="en-US" sz="7200" dirty="0">
-              <a:solidFill>
-                <a:schemeClr val="tx1"/>
-              </a:solidFill>
-            </a:endParaRPr>
-          </a:p>
-        </p:txBody>
-      </p:sp>
-      <p:sp>
-        <p:nvSpPr>
-          <p:cNvPr id="5" name="Subtitle 1"/>
-          <p:cNvSpPr txBox="1">
-            <a:spLocks/>
-          </p:cNvSpPr>
-          <p:nvPr/>
-        </p:nvSpPr>
-        <p:spPr>
-          <a:xfrm>
-            <a:off x="720342" y="2169083"/>
-            <a:ext cx="7608765" cy="2238552"/>
-          </a:xfrm>
-          <a:prstGeom prst="rect">
-            <a:avLst/>
-          </a:prstGeom>
-        </p:spPr>
-        <p:txBody>
-          <a:bodyPr/>
-          <a:lstStyle>
-            <a:lvl1pPr marL="0" indent="0" algn="l" defTabSz="914377" rtl="0" eaLnBrk="1" latinLnBrk="0" hangingPunct="1">
-              <a:lnSpc>
-                <a:spcPct val="90000"/>
-              </a:lnSpc>
-              <a:spcBef>
-                <a:spcPts val="2400"/>
-              </a:spcBef>
-              <a:buFont typeface="Arial" panose="020B0604020202020204" pitchFamily="34" charset="0"/>
-              <a:buNone/>
-              <a:defRPr sz="3733" b="0" kern="1200">
-                <a:solidFill>
-                  <a:schemeClr val="accent1"/>
-                </a:solidFill>
-                <a:latin typeface="+mj-lt"/>
-                <a:ea typeface="+mn-ea"/>
-                <a:cs typeface="+mn-cs"/>
-              </a:defRPr>
-            </a:lvl1pPr>
-            <a:lvl2pPr marL="0" indent="0" algn="l" defTabSz="914377" rtl="0" eaLnBrk="1" latinLnBrk="0" hangingPunct="1">
-              <a:lnSpc>
-                <a:spcPct val="90000"/>
-              </a:lnSpc>
-              <a:spcBef>
-                <a:spcPts val="600"/>
-              </a:spcBef>
-              <a:buFont typeface="Arial" panose="020B0604020202020204" pitchFamily="34" charset="0"/>
-              <a:buNone/>
-              <a:defRPr sz="2400" kern="1200">
-                <a:solidFill>
-                  <a:schemeClr val="tx1"/>
-                </a:solidFill>
-                <a:latin typeface="+mn-lt"/>
-                <a:ea typeface="+mn-ea"/>
-                <a:cs typeface="+mn-cs"/>
-              </a:defRPr>
-            </a:lvl2pPr>
-            <a:lvl3pPr marL="233357" indent="-228594" algn="l" defTabSz="914377" rtl="0" eaLnBrk="1" latinLnBrk="0" hangingPunct="1">
-              <a:lnSpc>
-                <a:spcPct val="90000"/>
-              </a:lnSpc>
-              <a:spcBef>
-                <a:spcPts val="600"/>
-              </a:spcBef>
-              <a:buFont typeface="Arial" panose="020B0604020202020204" pitchFamily="34" charset="0"/>
-              <a:buChar char="•"/>
-              <a:defRPr sz="2400" kern="1200">
-                <a:solidFill>
-                  <a:schemeClr val="tx1"/>
-                </a:solidFill>
-                <a:latin typeface="+mn-lt"/>
-                <a:ea typeface="+mn-ea"/>
-                <a:cs typeface="+mn-cs"/>
-              </a:defRPr>
-            </a:lvl3pPr>
-            <a:lvl4pPr marL="457189" indent="-228594" algn="l" defTabSz="914377" rtl="0" eaLnBrk="1" latinLnBrk="0" hangingPunct="1">
-              <a:lnSpc>
-                <a:spcPct val="90000"/>
-              </a:lnSpc>
-              <a:spcBef>
-                <a:spcPts val="600"/>
-              </a:spcBef>
-              <a:buFont typeface="Arial" panose="020B0604020202020204" pitchFamily="34" charset="0"/>
-              <a:buChar char="•"/>
-              <a:defRPr sz="2400" kern="1200">
-                <a:solidFill>
-                  <a:schemeClr val="tx1"/>
-                </a:solidFill>
-                <a:latin typeface="+mn-lt"/>
-                <a:ea typeface="+mn-ea"/>
-                <a:cs typeface="+mn-cs"/>
-              </a:defRPr>
-            </a:lvl4pPr>
-            <a:lvl5pPr marL="690545" indent="-228594" algn="l" defTabSz="914377" rtl="0" eaLnBrk="1" latinLnBrk="0" hangingPunct="1">
-              <a:lnSpc>
-                <a:spcPct val="90000"/>
-              </a:lnSpc>
-              <a:spcBef>
-                <a:spcPts val="600"/>
-              </a:spcBef>
-              <a:buFont typeface="Arial" panose="020B0604020202020204" pitchFamily="34" charset="0"/>
-              <a:buChar char="•"/>
-              <a:defRPr sz="2400" kern="1200">
-                <a:solidFill>
-                  <a:schemeClr val="tx1"/>
-                </a:solidFill>
-                <a:latin typeface="+mn-lt"/>
-                <a:ea typeface="+mn-ea"/>
-                <a:cs typeface="+mn-cs"/>
-              </a:defRPr>
-            </a:lvl5pPr>
-            <a:lvl6pPr marL="2514537" indent="-228594" algn="l" defTabSz="914377" rtl="0" eaLnBrk="1" latinLnBrk="0" hangingPunct="1">
-              <a:lnSpc>
-                <a:spcPct val="90000"/>
-              </a:lnSpc>
-              <a:spcBef>
-                <a:spcPts val="500"/>
-              </a:spcBef>
-              <a:buFont typeface="Arial" panose="020B0604020202020204" pitchFamily="34" charset="0"/>
-              <a:buChar char="•"/>
-              <a:defRPr sz="1867" kern="1200">
-                <a:solidFill>
-                  <a:schemeClr val="tx1"/>
-                </a:solidFill>
-                <a:latin typeface="+mn-lt"/>
-                <a:ea typeface="+mn-ea"/>
-                <a:cs typeface="+mn-cs"/>
-              </a:defRPr>
-            </a:lvl6pPr>
-            <a:lvl7pPr marL="2971726" indent="-228594" algn="l" defTabSz="914377" rtl="0" eaLnBrk="1" latinLnBrk="0" hangingPunct="1">
-              <a:lnSpc>
-                <a:spcPct val="90000"/>
-              </a:lnSpc>
-              <a:spcBef>
-                <a:spcPts val="500"/>
-              </a:spcBef>
-              <a:buFont typeface="Arial" panose="020B0604020202020204" pitchFamily="34" charset="0"/>
-              <a:buChar char="•"/>
-              <a:defRPr sz="1867" kern="1200">
-                <a:solidFill>
-                  <a:schemeClr val="tx1"/>
-                </a:solidFill>
-                <a:latin typeface="+mn-lt"/>
-                <a:ea typeface="+mn-ea"/>
-                <a:cs typeface="+mn-cs"/>
-              </a:defRPr>
-            </a:lvl7pPr>
-            <a:lvl8pPr marL="3428914" indent="-228594" algn="l" defTabSz="914377" rtl="0" eaLnBrk="1" latinLnBrk="0" hangingPunct="1">
-              <a:lnSpc>
-                <a:spcPct val="90000"/>
-              </a:lnSpc>
-              <a:spcBef>
-                <a:spcPts val="500"/>
-              </a:spcBef>
-              <a:buFont typeface="Arial" panose="020B0604020202020204" pitchFamily="34" charset="0"/>
-              <a:buChar char="•"/>
-              <a:defRPr sz="1867" kern="1200">
-                <a:solidFill>
-                  <a:schemeClr val="tx1"/>
-                </a:solidFill>
-                <a:latin typeface="+mn-lt"/>
-                <a:ea typeface="+mn-ea"/>
-                <a:cs typeface="+mn-cs"/>
-              </a:defRPr>
-            </a:lvl8pPr>
-            <a:lvl9pPr marL="3886103" indent="-228594" algn="l" defTabSz="914377" rtl="0" eaLnBrk="1" latinLnBrk="0" hangingPunct="1">
-              <a:lnSpc>
-                <a:spcPct val="90000"/>
-              </a:lnSpc>
-              <a:spcBef>
-                <a:spcPts val="500"/>
-              </a:spcBef>
-              <a:buFont typeface="Arial" panose="020B0604020202020204" pitchFamily="34" charset="0"/>
-              <a:buChar char="•"/>
-              <a:defRPr sz="1867" kern="1200">
-                <a:solidFill>
-                  <a:schemeClr val="tx1"/>
-                </a:solidFill>
-                <a:latin typeface="+mn-lt"/>
-                <a:ea typeface="+mn-ea"/>
-                <a:cs typeface="+mn-cs"/>
-              </a:defRPr>
-            </a:lvl9pPr>
-          </a:lstStyle>
-          <a:p>
-            <a:r>
-              <a:rPr lang="en-US" dirty="0" smtClean="0">
-                <a:solidFill>
-                  <a:schemeClr val="tx1"/>
-                </a:solidFill>
-              </a:rPr>
-              <a:t>Sevilla</a:t>
-            </a:r>
-            <a:endParaRPr lang="en-US" dirty="0" smtClean="0">
-              <a:solidFill>
-                <a:schemeClr val="tx1"/>
-              </a:solidFill>
-            </a:endParaRPr>
-          </a:p>
-        </p:txBody>
-      </p:sp>
-    </p:spTree>
-    <p:extLst>
-      <p:ext uri="{BB962C8B-B14F-4D97-AF65-F5344CB8AC3E}">
-        <p14:creationId xmlns:p14="http://schemas.microsoft.com/office/powerpoint/2010/main" val="461489940"/>
-      </p:ext>
-    </p:extLst>
-  </p:cSld>
-  <p:clrMapOvr>
-    <a:masterClrMapping/>
-  </p:clrMapOvr>
-  <p:transition>
-    <p:fade/>
-  </p:transition>
   <p:timing>
     <p:tnLst>
       <p:par>
@@ -29467,6 +30107,25 @@
 </file>
 
 <file path=customXml/item1.xml><?xml version="1.0" encoding="utf-8"?>
+<p:properties xmlns:p="http://schemas.microsoft.com/office/2006/metadata/properties" xmlns:xsi="http://www.w3.org/2001/XMLSchema-instance" xmlns:pc="http://schemas.microsoft.com/office/infopath/2007/PartnerControls">
+  <documentManagement>
+    <Module xmlns="EEE5B532-0FC6-42A2-92D4-EABE09DEBFCC" xsi:nil="true"/>
+    <Status xmlns="EEE5B532-0FC6-42A2-92D4-EABE09DEBFCC">Final</Status>
+    <Content_x0020_Type xmlns="EEE5B532-0FC6-42A2-92D4-EABE09DEBFCC">Slide Presentation</Content_x0020_Type>
+  </documentManagement>
+</p:properties>
+</file>
+
+<file path=customXml/item2.xml><?xml version="1.0" encoding="utf-8"?>
+<?mso-contentType ?>
+<FormTemplates xmlns="http://schemas.microsoft.com/sharepoint/v3/contenttype/forms">
+  <Display>DocumentLibraryForm</Display>
+  <Edit>DocumentLibraryForm</Edit>
+  <New>DocumentLibraryForm</New>
+</FormTemplates>
+</file>
+
+<file path=customXml/item3.xml><?xml version="1.0" encoding="utf-8"?>
 <ct:contentTypeSchema xmlns:ct="http://schemas.microsoft.com/office/2006/metadata/contentType" xmlns:ma="http://schemas.microsoft.com/office/2006/metadata/properties/metaAttributes" ct:_="" ma:_="" ma:contentTypeName="Document" ma:contentTypeID="0x01010077A91A40830EBD43BE524A7CE4B3AE1E" ma:contentTypeVersion="" ma:contentTypeDescription="Create a new document." ma:contentTypeScope="" ma:versionID="564620281baef6ba28e9e829bb933c81">
   <xsd:schema xmlns:xsd="http://www.w3.org/2001/XMLSchema" xmlns:xs="http://www.w3.org/2001/XMLSchema" xmlns:p="http://schemas.microsoft.com/office/2006/metadata/properties" xmlns:ns2="EEE5B532-0FC6-42A2-92D4-EABE09DEBFCC" targetNamespace="http://schemas.microsoft.com/office/2006/metadata/properties" ma:root="true" ma:fieldsID="e0bdcf4237a0a33696396f5b9319db96" ns2:_="">
     <xsd:import namespace="EEE5B532-0FC6-42A2-92D4-EABE09DEBFCC"/>
@@ -29622,26 +30281,31 @@
 </ct:contentTypeSchema>
 </file>
 
-<file path=customXml/item2.xml><?xml version="1.0" encoding="utf-8"?>
-<?mso-contentType ?>
-<FormTemplates xmlns="http://schemas.microsoft.com/sharepoint/v3/contenttype/forms">
-  <Display>DocumentLibraryForm</Display>
-  <Edit>DocumentLibraryForm</Edit>
-  <New>DocumentLibraryForm</New>
-</FormTemplates>
+<file path=customXml/itemProps1.xml><?xml version="1.0" encoding="utf-8"?>
+<ds:datastoreItem xmlns:ds="http://schemas.openxmlformats.org/officeDocument/2006/customXml" ds:itemID="{FF5E1494-6B65-4E1E-9729-2B216CB62627}">
+  <ds:schemaRefs>
+    <ds:schemaRef ds:uri="http://purl.org/dc/elements/1.1/"/>
+    <ds:schemaRef ds:uri="EEE5B532-0FC6-42A2-92D4-EABE09DEBFCC"/>
+    <ds:schemaRef ds:uri="http://purl.org/dc/terms/"/>
+    <ds:schemaRef ds:uri="http://schemas.microsoft.com/office/2006/metadata/properties"/>
+    <ds:schemaRef ds:uri="http://schemas.microsoft.com/office/2006/documentManagement/types"/>
+    <ds:schemaRef ds:uri="http://schemas.microsoft.com/office/infopath/2007/PartnerControls"/>
+    <ds:schemaRef ds:uri="http://schemas.openxmlformats.org/package/2006/metadata/core-properties"/>
+    <ds:schemaRef ds:uri="http://www.w3.org/XML/1998/namespace"/>
+    <ds:schemaRef ds:uri="http://purl.org/dc/dcmitype/"/>
+  </ds:schemaRefs>
+</ds:datastoreItem>
 </file>
 
-<file path=customXml/item3.xml><?xml version="1.0" encoding="utf-8"?>
-<p:properties xmlns:p="http://schemas.microsoft.com/office/2006/metadata/properties" xmlns:xsi="http://www.w3.org/2001/XMLSchema-instance" xmlns:pc="http://schemas.microsoft.com/office/infopath/2007/PartnerControls">
-  <documentManagement>
-    <Module xmlns="EEE5B532-0FC6-42A2-92D4-EABE09DEBFCC" xsi:nil="true"/>
-    <Status xmlns="EEE5B532-0FC6-42A2-92D4-EABE09DEBFCC">Final</Status>
-    <Content_x0020_Type xmlns="EEE5B532-0FC6-42A2-92D4-EABE09DEBFCC">Slide Presentation</Content_x0020_Type>
-  </documentManagement>
-</p:properties>
+<file path=customXml/itemProps2.xml><?xml version="1.0" encoding="utf-8"?>
+<ds:datastoreItem xmlns:ds="http://schemas.openxmlformats.org/officeDocument/2006/customXml" ds:itemID="{56A11EA6-2FC2-46BC-88D1-DD1545DDA3D6}">
+  <ds:schemaRefs>
+    <ds:schemaRef ds:uri="http://schemas.microsoft.com/sharepoint/v3/contenttype/forms"/>
+  </ds:schemaRefs>
+</ds:datastoreItem>
 </file>
 
-<file path=customXml/itemProps1.xml><?xml version="1.0" encoding="utf-8"?>
+<file path=customXml/itemProps3.xml><?xml version="1.0" encoding="utf-8"?>
 <ds:datastoreItem xmlns:ds="http://schemas.openxmlformats.org/officeDocument/2006/customXml" ds:itemID="{DE9A42DE-7C1D-459D-B825-997C7A9B9B0F}">
   <ds:schemaRefs>
     <ds:schemaRef ds:uri="http://schemas.microsoft.com/office/2006/metadata/contentType"/>
@@ -29657,28 +30321,4 @@
     <ds:schemaRef ds:uri="http://schemas.microsoft.com/internal/obd"/>
   </ds:schemaRefs>
 </ds:datastoreItem>
-</file>
-
-<file path=customXml/itemProps2.xml><?xml version="1.0" encoding="utf-8"?>
-<ds:datastoreItem xmlns:ds="http://schemas.openxmlformats.org/officeDocument/2006/customXml" ds:itemID="{56A11EA6-2FC2-46BC-88D1-DD1545DDA3D6}">
-  <ds:schemaRefs>
-    <ds:schemaRef ds:uri="http://schemas.microsoft.com/sharepoint/v3/contenttype/forms"/>
-  </ds:schemaRefs>
-</ds:datastoreItem>
-</file>
-
-<file path=customXml/itemProps3.xml><?xml version="1.0" encoding="utf-8"?>
-<ds:datastoreItem xmlns:ds="http://schemas.openxmlformats.org/officeDocument/2006/customXml" ds:itemID="{FF5E1494-6B65-4E1E-9729-2B216CB62627}">
-  <ds:schemaRefs>
-    <ds:schemaRef ds:uri="http://purl.org/dc/elements/1.1/"/>
-    <ds:schemaRef ds:uri="EEE5B532-0FC6-42A2-92D4-EABE09DEBFCC"/>
-    <ds:schemaRef ds:uri="http://purl.org/dc/terms/"/>
-    <ds:schemaRef ds:uri="http://schemas.microsoft.com/office/2006/metadata/properties"/>
-    <ds:schemaRef ds:uri="http://schemas.microsoft.com/office/2006/documentManagement/types"/>
-    <ds:schemaRef ds:uri="http://schemas.microsoft.com/office/infopath/2007/PartnerControls"/>
-    <ds:schemaRef ds:uri="http://schemas.openxmlformats.org/package/2006/metadata/core-properties"/>
-    <ds:schemaRef ds:uri="http://www.w3.org/XML/1998/namespace"/>
-    <ds:schemaRef ds:uri="http://purl.org/dc/dcmitype/"/>
-  </ds:schemaRefs>
-</ds:datastoreItem>
 </file>
</xml_diff>

<commit_message>
Updated Game Jam PPTX
</commit_message>
<xml_diff>
--- a/Windows 10 Game Jam/Windows 10 GameJam Sevilla.pptx
+++ b/Windows 10 Game Jam/Windows 10 GameJam Sevilla.pptx
@@ -5,7 +5,7 @@
     <p:sldMasterId id="2147483717" r:id="rId4"/>
   </p:sldMasterIdLst>
   <p:notesMasterIdLst>
-    <p:notesMasterId r:id="rId15"/>
+    <p:notesMasterId r:id="rId16"/>
   </p:notesMasterIdLst>
   <p:sldIdLst>
     <p:sldId id="256" r:id="rId5"/>
@@ -13,11 +13,12 @@
     <p:sldId id="272" r:id="rId7"/>
     <p:sldId id="276" r:id="rId8"/>
     <p:sldId id="274" r:id="rId9"/>
-    <p:sldId id="275" r:id="rId10"/>
-    <p:sldId id="270" r:id="rId11"/>
-    <p:sldId id="273" r:id="rId12"/>
-    <p:sldId id="271" r:id="rId13"/>
-    <p:sldId id="269" r:id="rId14"/>
+    <p:sldId id="278" r:id="rId10"/>
+    <p:sldId id="275" r:id="rId11"/>
+    <p:sldId id="270" r:id="rId12"/>
+    <p:sldId id="273" r:id="rId13"/>
+    <p:sldId id="271" r:id="rId14"/>
+    <p:sldId id="269" r:id="rId15"/>
   </p:sldIdLst>
   <p:sldSz cx="12192000" cy="6858000"/>
   <p:notesSz cx="6858000" cy="9144000"/>
@@ -209,7 +210,7 @@
           <a:p>
             <a:fld id="{B390C43E-5EEF-443B-AEB9-2D45B8F4AF4F}" type="datetimeFigureOut">
               <a:rPr lang="en-US" smtClean="0"/>
-              <a:t>5/10/2015</a:t>
+              <a:t>5/13/2015</a:t>
             </a:fld>
             <a:endParaRPr lang="en-US"/>
           </a:p>
@@ -885,7 +886,7 @@
     </p:spTree>
     <p:extLst>
       <p:ext uri="{BB962C8B-B14F-4D97-AF65-F5344CB8AC3E}">
-        <p14:creationId xmlns:p14="http://schemas.microsoft.com/office/powerpoint/2010/main" val="1662789470"/>
+        <p14:creationId xmlns:p14="http://schemas.microsoft.com/office/powerpoint/2010/main" val="3171804341"/>
       </p:ext>
     </p:extLst>
   </p:cSld>
@@ -990,6 +991,111 @@
     </p:spTree>
     <p:extLst>
       <p:ext uri="{BB962C8B-B14F-4D97-AF65-F5344CB8AC3E}">
+        <p14:creationId xmlns:p14="http://schemas.microsoft.com/office/powerpoint/2010/main" val="1662789470"/>
+      </p:ext>
+    </p:extLst>
+  </p:cSld>
+  <p:clrMapOvr>
+    <a:masterClrMapping/>
+  </p:clrMapOvr>
+</p:notes>
+</file>
+
+<file path=ppt/notesSlides/notesSlide6.xml><?xml version="1.0" encoding="utf-8"?>
+<p:notes xmlns:a="http://schemas.openxmlformats.org/drawingml/2006/main" xmlns:r="http://schemas.openxmlformats.org/officeDocument/2006/relationships" xmlns:p="http://schemas.openxmlformats.org/presentationml/2006/main">
+  <p:cSld>
+    <p:spTree>
+      <p:nvGrpSpPr>
+        <p:cNvPr id="1" name=""/>
+        <p:cNvGrpSpPr/>
+        <p:nvPr/>
+      </p:nvGrpSpPr>
+      <p:grpSpPr>
+        <a:xfrm>
+          <a:off x="0" y="0"/>
+          <a:ext cx="0" cy="0"/>
+          <a:chOff x="0" y="0"/>
+          <a:chExt cx="0" cy="0"/>
+        </a:xfrm>
+      </p:grpSpPr>
+      <p:sp>
+        <p:nvSpPr>
+          <p:cNvPr id="2" name="Slide Image Placeholder 1"/>
+          <p:cNvSpPr>
+            <a:spLocks noGrp="1" noRot="1" noChangeAspect="1"/>
+          </p:cNvSpPr>
+          <p:nvPr>
+            <p:ph type="sldImg"/>
+          </p:nvPr>
+        </p:nvSpPr>
+        <p:spPr/>
+      </p:sp>
+      <p:sp>
+        <p:nvSpPr>
+          <p:cNvPr id="3" name="Notes Placeholder 2"/>
+          <p:cNvSpPr>
+            <a:spLocks noGrp="1"/>
+          </p:cNvSpPr>
+          <p:nvPr>
+            <p:ph type="body" idx="1"/>
+          </p:nvPr>
+        </p:nvSpPr>
+        <p:spPr/>
+        <p:txBody>
+          <a:bodyPr>
+            <a:normAutofit/>
+          </a:bodyPr>
+          <a:lstStyle/>
+          <a:p>
+            <a:pPr>
+              <a:lnSpc>
+                <a:spcPct val="115000"/>
+              </a:lnSpc>
+              <a:spcBef>
+                <a:spcPts val="1000"/>
+              </a:spcBef>
+            </a:pPr>
+            <a:endParaRPr lang="en-US" sz="1400" dirty="0">
+              <a:ea typeface="Calibri"/>
+              <a:cs typeface="Times New Roman"/>
+            </a:endParaRPr>
+          </a:p>
+        </p:txBody>
+      </p:sp>
+      <p:sp>
+        <p:nvSpPr>
+          <p:cNvPr id="4" name="Slide Number Placeholder 3"/>
+          <p:cNvSpPr>
+            <a:spLocks noGrp="1"/>
+          </p:cNvSpPr>
+          <p:nvPr>
+            <p:ph type="sldNum" sz="quarter" idx="10"/>
+          </p:nvPr>
+        </p:nvSpPr>
+        <p:spPr>
+          <a:xfrm>
+            <a:off x="3884613" y="8685213"/>
+            <a:ext cx="2971800" cy="457200"/>
+          </a:xfrm>
+          <a:prstGeom prst="rect">
+            <a:avLst/>
+          </a:prstGeom>
+        </p:spPr>
+        <p:txBody>
+          <a:bodyPr/>
+          <a:lstStyle/>
+          <a:p>
+            <a:fld id="{B59DFEC3-DDF1-47FC-A429-F37F4C396648}" type="slidenum">
+              <a:rPr lang="en-US" smtClean="0"/>
+              <a:t>8</a:t>
+            </a:fld>
+            <a:endParaRPr lang="en-US"/>
+          </a:p>
+        </p:txBody>
+      </p:sp>
+    </p:spTree>
+    <p:extLst>
+      <p:ext uri="{BB962C8B-B14F-4D97-AF65-F5344CB8AC3E}">
         <p14:creationId xmlns:p14="http://schemas.microsoft.com/office/powerpoint/2010/main" val="3801914601"/>
       </p:ext>
     </p:extLst>
@@ -1000,7 +1106,7 @@
 </p:notes>
 </file>
 
-<file path=ppt/notesSlides/notesSlide6.xml><?xml version="1.0" encoding="utf-8"?>
+<file path=ppt/notesSlides/notesSlide7.xml><?xml version="1.0" encoding="utf-8"?>
 <p:notes xmlns:a="http://schemas.openxmlformats.org/drawingml/2006/main" xmlns:r="http://schemas.openxmlformats.org/officeDocument/2006/relationships" xmlns:p="http://schemas.openxmlformats.org/presentationml/2006/main">
   <p:cSld>
     <p:spTree>
@@ -1073,7 +1179,7 @@
           <a:p>
             <a:fld id="{1DCEFCAB-67CC-4A0C-8E3C-462167FA539E}" type="slidenum">
               <a:rPr lang="es-ES" smtClean="0"/>
-              <a:t>8</a:t>
+              <a:t>9</a:t>
             </a:fld>
             <a:endParaRPr lang="es-ES"/>
           </a:p>
@@ -1092,7 +1198,7 @@
 </p:notes>
 </file>
 
-<file path=ppt/notesSlides/notesSlide7.xml><?xml version="1.0" encoding="utf-8"?>
+<file path=ppt/notesSlides/notesSlide8.xml><?xml version="1.0" encoding="utf-8"?>
 <p:notes xmlns:a="http://schemas.openxmlformats.org/drawingml/2006/main" xmlns:r="http://schemas.openxmlformats.org/officeDocument/2006/relationships" xmlns:p="http://schemas.openxmlformats.org/presentationml/2006/main">
   <p:cSld>
     <p:spTree>
@@ -1176,7 +1282,7 @@
           <a:p>
             <a:fld id="{B59DFEC3-DDF1-47FC-A429-F37F4C396648}" type="slidenum">
               <a:rPr lang="en-US" smtClean="0"/>
-              <a:t>9</a:t>
+              <a:t>10</a:t>
             </a:fld>
             <a:endParaRPr lang="en-US"/>
           </a:p>
@@ -1195,7 +1301,7 @@
 </p:notes>
 </file>
 
-<file path=ppt/notesSlides/notesSlide8.xml><?xml version="1.0" encoding="utf-8"?>
+<file path=ppt/notesSlides/notesSlide9.xml><?xml version="1.0" encoding="utf-8"?>
 <p:notes xmlns:a="http://schemas.openxmlformats.org/drawingml/2006/main" xmlns:r="http://schemas.openxmlformats.org/officeDocument/2006/relationships" xmlns:p="http://schemas.openxmlformats.org/presentationml/2006/main">
   <p:cSld>
     <p:spTree>
@@ -1260,7 +1366,7 @@
           <a:p>
             <a:fld id="{5F6749EE-0623-43D7-8084-EC6C776BBF87}" type="slidenum">
               <a:rPr lang="en-US" smtClean="0"/>
-              <a:t>10</a:t>
+              <a:t>11</a:t>
             </a:fld>
             <a:endParaRPr lang="en-US"/>
           </a:p>
@@ -20201,7 +20307,7 @@
                 </a:solidFill>
               </a:rPr>
               <a:pPr/>
-              <a:t>5/10/2015</a:t>
+              <a:t>5/13/2015</a:t>
             </a:fld>
             <a:endParaRPr lang="en-US">
               <a:solidFill>
@@ -20524,7 +20630,7 @@
           <a:p>
             <a:fld id="{6DD3B76A-C5DE-4B9A-BEAE-BBF0DC17AAA8}" type="datetime1">
               <a:rPr lang="en-US" smtClean="0"/>
-              <a:t>5/10/2015</a:t>
+              <a:t>5/13/2015</a:t>
             </a:fld>
             <a:endParaRPr lang="en-US" dirty="0"/>
           </a:p>
@@ -26863,6 +26969,341 @@
       </p:grpSpPr>
       <p:sp>
         <p:nvSpPr>
+          <p:cNvPr id="2" name="Title 3"/>
+          <p:cNvSpPr txBox="1">
+            <a:spLocks/>
+          </p:cNvSpPr>
+          <p:nvPr/>
+        </p:nvSpPr>
+        <p:spPr>
+          <a:xfrm>
+            <a:off x="278362" y="405426"/>
+            <a:ext cx="11533177" cy="517065"/>
+          </a:xfrm>
+          <a:prstGeom prst="rect">
+            <a:avLst/>
+          </a:prstGeom>
+        </p:spPr>
+        <p:txBody>
+          <a:bodyPr vert="horz" wrap="square" lIns="0" tIns="0" rIns="0" bIns="0" rtlCol="0" anchor="t" anchorCtr="0">
+            <a:spAutoFit/>
+          </a:bodyPr>
+          <a:lstStyle>
+            <a:lvl1pPr algn="l" defTabSz="914400" rtl="0" eaLnBrk="1" latinLnBrk="0" hangingPunct="1">
+              <a:lnSpc>
+                <a:spcPct val="105000"/>
+              </a:lnSpc>
+              <a:spcBef>
+                <a:spcPct val="0"/>
+              </a:spcBef>
+              <a:buNone/>
+              <a:defRPr sz="2400" kern="1200" spc="0" baseline="0">
+                <a:solidFill>
+                  <a:schemeClr val="accent1"/>
+                </a:solidFill>
+                <a:latin typeface="+mj-lt"/>
+                <a:ea typeface="+mj-ea"/>
+                <a:cs typeface="+mj-cs"/>
+              </a:defRPr>
+            </a:lvl1pPr>
+          </a:lstStyle>
+          <a:p>
+            <a:r>
+              <a:rPr lang="en-US" sz="3200"/>
+              <a:t>Preguntas y respuestas.</a:t>
+            </a:r>
+            <a:endParaRPr lang="ru-RU" sz="3200" dirty="0"/>
+          </a:p>
+        </p:txBody>
+      </p:sp>
+      <p:sp>
+        <p:nvSpPr>
+          <p:cNvPr id="3" name="Text Placeholder 1"/>
+          <p:cNvSpPr>
+            <a:spLocks noGrp="1"/>
+          </p:cNvSpPr>
+          <p:nvPr>
+            <p:ph type="body" sz="quarter" idx="20"/>
+          </p:nvPr>
+        </p:nvSpPr>
+        <p:spPr>
+          <a:xfrm>
+            <a:off x="335360" y="1435101"/>
+            <a:ext cx="11461195" cy="841772"/>
+          </a:xfrm>
+        </p:spPr>
+        <p:txBody>
+          <a:bodyPr/>
+          <a:lstStyle/>
+          <a:p>
+            <a:r>
+              <a:rPr lang="en-US" sz="3733" dirty="0"/>
+              <a:t>¿</a:t>
+            </a:r>
+            <a:r>
+              <a:rPr lang="en-US" sz="3733" dirty="0" err="1"/>
+              <a:t>Dudas</a:t>
+            </a:r>
+            <a:r>
+              <a:rPr lang="en-US" sz="3733" dirty="0"/>
+              <a:t>?</a:t>
+            </a:r>
+            <a:endParaRPr lang="ru-RU" sz="3733" dirty="0"/>
+          </a:p>
+        </p:txBody>
+      </p:sp>
+      <p:sp>
+        <p:nvSpPr>
+          <p:cNvPr id="4" name="Text Placeholder 1"/>
+          <p:cNvSpPr txBox="1">
+            <a:spLocks/>
+          </p:cNvSpPr>
+          <p:nvPr/>
+        </p:nvSpPr>
+        <p:spPr>
+          <a:xfrm>
+            <a:off x="431371" y="2084851"/>
+            <a:ext cx="11261672" cy="3072341"/>
+          </a:xfrm>
+          <a:prstGeom prst="rect">
+            <a:avLst/>
+          </a:prstGeom>
+        </p:spPr>
+        <p:txBody>
+          <a:bodyPr vert="horz" lIns="121920" tIns="0" rIns="121920" bIns="60960" rtlCol="0">
+            <a:noAutofit/>
+          </a:bodyPr>
+          <a:lstStyle>
+            <a:lvl1pPr marL="0" indent="0" algn="l" defTabSz="914400" rtl="0" eaLnBrk="1" latinLnBrk="0" hangingPunct="1">
+              <a:spcBef>
+                <a:spcPct val="20000"/>
+              </a:spcBef>
+              <a:buFont typeface="Arial" pitchFamily="34" charset="0"/>
+              <a:buNone/>
+              <a:defRPr sz="2800" kern="1200">
+                <a:solidFill>
+                  <a:schemeClr val="bg1"/>
+                </a:solidFill>
+                <a:latin typeface="+mn-lt"/>
+                <a:ea typeface="+mn-ea"/>
+                <a:cs typeface="+mn-cs"/>
+              </a:defRPr>
+            </a:lvl1pPr>
+            <a:lvl2pPr marL="0" indent="0" algn="l" defTabSz="914400" rtl="0" eaLnBrk="1" latinLnBrk="0" hangingPunct="1">
+              <a:spcBef>
+                <a:spcPct val="20000"/>
+              </a:spcBef>
+              <a:buFont typeface="Arial" pitchFamily="34" charset="0"/>
+              <a:buNone/>
+              <a:defRPr sz="1600" kern="1200">
+                <a:solidFill>
+                  <a:schemeClr val="tx2"/>
+                </a:solidFill>
+                <a:latin typeface="+mn-lt"/>
+                <a:ea typeface="+mn-ea"/>
+                <a:cs typeface="+mn-cs"/>
+              </a:defRPr>
+            </a:lvl2pPr>
+            <a:lvl3pPr marL="447675" indent="-180975" algn="l" defTabSz="914400" rtl="0" eaLnBrk="1" latinLnBrk="0" hangingPunct="1">
+              <a:spcBef>
+                <a:spcPct val="20000"/>
+              </a:spcBef>
+              <a:buClr>
+                <a:schemeClr val="accent1"/>
+              </a:buClr>
+              <a:buSzPct val="120000"/>
+              <a:buFont typeface="Arial" pitchFamily="34" charset="0"/>
+              <a:buChar char="•"/>
+              <a:defRPr sz="1600" kern="1200">
+                <a:solidFill>
+                  <a:schemeClr val="tx2"/>
+                </a:solidFill>
+                <a:latin typeface="+mn-lt"/>
+                <a:ea typeface="+mn-ea"/>
+                <a:cs typeface="+mn-cs"/>
+              </a:defRPr>
+            </a:lvl3pPr>
+            <a:lvl4pPr marL="714375" indent="-266700" algn="l" defTabSz="914400" rtl="0" eaLnBrk="1" latinLnBrk="0" hangingPunct="1">
+              <a:spcBef>
+                <a:spcPct val="20000"/>
+              </a:spcBef>
+              <a:buClr>
+                <a:schemeClr val="accent1"/>
+              </a:buClr>
+              <a:buFont typeface="Arial" pitchFamily="34" charset="0"/>
+              <a:buChar char="–"/>
+              <a:defRPr sz="1600" kern="1200">
+                <a:solidFill>
+                  <a:schemeClr val="tx2"/>
+                </a:solidFill>
+                <a:latin typeface="+mn-lt"/>
+                <a:ea typeface="+mn-ea"/>
+                <a:cs typeface="+mn-cs"/>
+              </a:defRPr>
+            </a:lvl4pPr>
+            <a:lvl5pPr marL="990600" indent="-276225" algn="l" defTabSz="914400" rtl="0" eaLnBrk="1" latinLnBrk="0" hangingPunct="1">
+              <a:spcBef>
+                <a:spcPct val="20000"/>
+              </a:spcBef>
+              <a:buClr>
+                <a:schemeClr val="accent1"/>
+              </a:buClr>
+              <a:buFont typeface="Arial" pitchFamily="34" charset="0"/>
+              <a:buChar char="»"/>
+              <a:defRPr sz="1600" kern="1200">
+                <a:solidFill>
+                  <a:schemeClr val="tx2"/>
+                </a:solidFill>
+                <a:latin typeface="+mn-lt"/>
+                <a:ea typeface="+mn-ea"/>
+                <a:cs typeface="+mn-cs"/>
+              </a:defRPr>
+            </a:lvl5pPr>
+            <a:lvl6pPr marL="2514600" indent="-228600" algn="l" defTabSz="914400" rtl="0" eaLnBrk="1" latinLnBrk="0" hangingPunct="1">
+              <a:spcBef>
+                <a:spcPct val="20000"/>
+              </a:spcBef>
+              <a:buFont typeface="Arial" pitchFamily="34" charset="0"/>
+              <a:buChar char="•"/>
+              <a:defRPr sz="2000" kern="1200">
+                <a:solidFill>
+                  <a:schemeClr val="tx1"/>
+                </a:solidFill>
+                <a:latin typeface="+mn-lt"/>
+                <a:ea typeface="+mn-ea"/>
+                <a:cs typeface="+mn-cs"/>
+              </a:defRPr>
+            </a:lvl6pPr>
+            <a:lvl7pPr marL="2971800" indent="-228600" algn="l" defTabSz="914400" rtl="0" eaLnBrk="1" latinLnBrk="0" hangingPunct="1">
+              <a:spcBef>
+                <a:spcPct val="20000"/>
+              </a:spcBef>
+              <a:buFont typeface="Arial" pitchFamily="34" charset="0"/>
+              <a:buChar char="•"/>
+              <a:defRPr sz="2000" kern="1200">
+                <a:solidFill>
+                  <a:schemeClr val="tx1"/>
+                </a:solidFill>
+                <a:latin typeface="+mn-lt"/>
+                <a:ea typeface="+mn-ea"/>
+                <a:cs typeface="+mn-cs"/>
+              </a:defRPr>
+            </a:lvl7pPr>
+            <a:lvl8pPr marL="3429000" indent="-228600" algn="l" defTabSz="914400" rtl="0" eaLnBrk="1" latinLnBrk="0" hangingPunct="1">
+              <a:spcBef>
+                <a:spcPct val="20000"/>
+              </a:spcBef>
+              <a:buFont typeface="Arial" pitchFamily="34" charset="0"/>
+              <a:buChar char="•"/>
+              <a:defRPr sz="2000" kern="1200">
+                <a:solidFill>
+                  <a:schemeClr val="tx1"/>
+                </a:solidFill>
+                <a:latin typeface="+mn-lt"/>
+                <a:ea typeface="+mn-ea"/>
+                <a:cs typeface="+mn-cs"/>
+              </a:defRPr>
+            </a:lvl8pPr>
+            <a:lvl9pPr marL="3886200" indent="-228600" algn="l" defTabSz="914400" rtl="0" eaLnBrk="1" latinLnBrk="0" hangingPunct="1">
+              <a:spcBef>
+                <a:spcPct val="20000"/>
+              </a:spcBef>
+              <a:buFont typeface="Arial" pitchFamily="34" charset="0"/>
+              <a:buChar char="•"/>
+              <a:defRPr sz="2000" kern="1200">
+                <a:solidFill>
+                  <a:schemeClr val="tx1"/>
+                </a:solidFill>
+                <a:latin typeface="+mn-lt"/>
+                <a:ea typeface="+mn-ea"/>
+                <a:cs typeface="+mn-cs"/>
+              </a:defRPr>
+            </a:lvl9pPr>
+          </a:lstStyle>
+          <a:p>
+            <a:pPr algn="ctr"/>
+            <a:r>
+              <a:rPr lang="en-US" sz="22133" dirty="0">
+                <a:solidFill>
+                  <a:schemeClr val="accent1"/>
+                </a:solidFill>
+                <a:latin typeface="Aller" pitchFamily="2" charset="0"/>
+              </a:rPr>
+              <a:t>P</a:t>
+            </a:r>
+            <a:r>
+              <a:rPr lang="en-US" sz="11733" dirty="0">
+                <a:solidFill>
+                  <a:schemeClr val="accent1"/>
+                </a:solidFill>
+                <a:latin typeface="Aller" pitchFamily="2" charset="0"/>
+              </a:rPr>
+              <a:t>&amp;</a:t>
+            </a:r>
+            <a:r>
+              <a:rPr lang="en-US" sz="22133" dirty="0">
+                <a:solidFill>
+                  <a:schemeClr val="accent1"/>
+                </a:solidFill>
+                <a:latin typeface="Aller" pitchFamily="2" charset="0"/>
+              </a:rPr>
+              <a:t>R</a:t>
+            </a:r>
+            <a:endParaRPr lang="ru-RU" sz="22133" dirty="0">
+              <a:solidFill>
+                <a:schemeClr val="accent1"/>
+              </a:solidFill>
+            </a:endParaRPr>
+          </a:p>
+        </p:txBody>
+      </p:sp>
+    </p:spTree>
+    <p:extLst>
+      <p:ext uri="{BB962C8B-B14F-4D97-AF65-F5344CB8AC3E}">
+        <p14:creationId xmlns:p14="http://schemas.microsoft.com/office/powerpoint/2010/main" val="2924883636"/>
+      </p:ext>
+    </p:extLst>
+  </p:cSld>
+  <p:clrMapOvr>
+    <a:masterClrMapping/>
+  </p:clrMapOvr>
+  <mc:AlternateContent xmlns:mc="http://schemas.openxmlformats.org/markup-compatibility/2006" xmlns:p14="http://schemas.microsoft.com/office/powerpoint/2010/main">
+    <mc:Choice Requires="p14">
+      <p:transition p14:dur="0"/>
+    </mc:Choice>
+    <mc:Fallback xmlns="">
+      <p:transition/>
+    </mc:Fallback>
+  </mc:AlternateContent>
+  <p:timing>
+    <p:tnLst>
+      <p:par>
+        <p:cTn id="1" dur="indefinite" restart="never" nodeType="tmRoot"/>
+      </p:par>
+    </p:tnLst>
+  </p:timing>
+</p:sld>
+</file>
+
+<file path=ppt/slides/slide11.xml><?xml version="1.0" encoding="utf-8"?>
+<p:sld xmlns:a="http://schemas.openxmlformats.org/drawingml/2006/main" xmlns:r="http://schemas.openxmlformats.org/officeDocument/2006/relationships" xmlns:p="http://schemas.openxmlformats.org/presentationml/2006/main">
+  <p:cSld>
+    <p:spTree>
+      <p:nvGrpSpPr>
+        <p:cNvPr id="1" name=""/>
+        <p:cNvGrpSpPr/>
+        <p:nvPr/>
+      </p:nvGrpSpPr>
+      <p:grpSpPr>
+        <a:xfrm>
+          <a:off x="0" y="0"/>
+          <a:ext cx="0" cy="0"/>
+          <a:chOff x="0" y="0"/>
+          <a:chExt cx="0" cy="0"/>
+        </a:xfrm>
+      </p:grpSpPr>
+      <p:sp>
+        <p:nvSpPr>
           <p:cNvPr id="3" name="Title 2"/>
           <p:cNvSpPr txBox="1">
             <a:spLocks/>
@@ -27926,14 +28367,14 @@
           <a:effectLst/>
           <a:extLst>
             <a:ext uri="{909E8E84-426E-40dd-AFC4-6F175D3DCCD1}">
-              <a14:hiddenFill xmlns:a14="http://schemas.microsoft.com/office/drawing/2010/main" xmlns="">
+              <a14:hiddenFill xmlns="" xmlns:a14="http://schemas.microsoft.com/office/drawing/2010/main">
                 <a:solidFill>
                   <a:schemeClr val="accent1"/>
                 </a:solidFill>
               </a14:hiddenFill>
             </a:ext>
             <a:ext uri="{91240B29-F687-4f45-9708-019B960494DF}">
-              <a14:hiddenLine xmlns:a14="http://schemas.microsoft.com/office/drawing/2010/main" xmlns="" w="9525">
+              <a14:hiddenLine xmlns="" xmlns:a14="http://schemas.microsoft.com/office/drawing/2010/main" w="9525">
                 <a:solidFill>
                   <a:schemeClr val="tx1"/>
                 </a:solidFill>
@@ -27943,7 +28384,7 @@
               </a14:hiddenLine>
             </a:ext>
             <a:ext uri="{AF507438-7753-43e0-B8FC-AC1667EBCBE1}">
-              <a14:hiddenEffects xmlns:a14="http://schemas.microsoft.com/office/drawing/2010/main" xmlns="">
+              <a14:hiddenEffects xmlns="" xmlns:a14="http://schemas.microsoft.com/office/drawing/2010/main">
                 <a:effectLst>
                   <a:outerShdw dist="35921" dir="2700000" algn="ctr" rotWithShape="0">
                     <a:schemeClr val="bg2"/>
@@ -28350,6 +28791,232 @@
           <a:lstStyle/>
           <a:p>
             <a:r>
+              <a:rPr lang="en-GB" sz="5400" dirty="0" smtClean="0"/>
+              <a:t>Catering</a:t>
+            </a:r>
+            <a:endParaRPr lang="en-GB" sz="5400" dirty="0"/>
+          </a:p>
+        </p:txBody>
+      </p:sp>
+      <p:sp>
+        <p:nvSpPr>
+          <p:cNvPr id="11" name="Content Placeholder 5"/>
+          <p:cNvSpPr>
+            <a:spLocks noGrp="1" noChangeAspect="1"/>
+          </p:cNvSpPr>
+          <p:nvPr>
+            <p:ph idx="1"/>
+          </p:nvPr>
+        </p:nvSpPr>
+        <p:spPr>
+          <a:xfrm>
+            <a:off x="509457" y="1429407"/>
+            <a:ext cx="10516024" cy="4897440"/>
+          </a:xfrm>
+        </p:spPr>
+        <p:txBody>
+          <a:bodyPr>
+            <a:normAutofit lnSpcReduction="10000"/>
+          </a:bodyPr>
+          <a:lstStyle/>
+          <a:p>
+            <a:r>
+              <a:rPr lang="es-ES" sz="1600" b="1" u="sng" dirty="0"/>
+              <a:t>VIERNES 15:</a:t>
+            </a:r>
+            <a:r>
+              <a:rPr lang="es-ES" sz="1600" dirty="0"/>
+              <a:t/>
+            </a:r>
+            <a:br>
+              <a:rPr lang="es-ES" sz="1600" dirty="0"/>
+            </a:br>
+            <a:r>
+              <a:rPr lang="es-ES" sz="1600" u="sng" dirty="0"/>
+              <a:t>Desayuno</a:t>
+            </a:r>
+            <a:r>
+              <a:rPr lang="es-ES" sz="1600" dirty="0"/>
+              <a:t>: </a:t>
+            </a:r>
+            <a:r>
+              <a:rPr lang="es-ES" sz="1600" dirty="0" smtClean="0"/>
+              <a:t>Será </a:t>
+            </a:r>
+            <a:r>
+              <a:rPr lang="es-ES" sz="1600" dirty="0"/>
+              <a:t>servido a las 12:00 horas. Estará compuesto por: café, leche, infusión, zumo de naranja natural, donut y croissant con mermelada. (50 botellas de agua extra)</a:t>
+            </a:r>
+          </a:p>
+          <a:p>
+            <a:r>
+              <a:rPr lang="es-ES" sz="1600" u="sng" dirty="0"/>
+              <a:t>Almuerzo</a:t>
+            </a:r>
+            <a:r>
+              <a:rPr lang="es-ES" sz="1600" dirty="0"/>
+              <a:t>: </a:t>
+            </a:r>
+            <a:r>
+              <a:rPr lang="es-ES" sz="1600" dirty="0" smtClean="0"/>
+              <a:t>Será </a:t>
+            </a:r>
+            <a:r>
+              <a:rPr lang="es-ES" sz="1600" dirty="0"/>
+              <a:t>servido a las 13:30 horas. Servido por dos camareros. Constará de pinchos de tortilla de patatas, medias noches (mechada, manzana y alioli) , piruletas de buey y chupito de gazpacho. Dos piezas de cada pincho por comensal. 12 platos de jamón y tres bebidas por persona.</a:t>
+            </a:r>
+          </a:p>
+          <a:p>
+            <a:r>
+              <a:rPr lang="es-ES" sz="1600" u="sng" dirty="0"/>
+              <a:t>Merienda</a:t>
+            </a:r>
+            <a:r>
+              <a:rPr lang="es-ES" sz="1600" dirty="0"/>
+              <a:t>: </a:t>
+            </a:r>
+            <a:r>
+              <a:rPr lang="es-ES" sz="1600" dirty="0" smtClean="0"/>
+              <a:t>Será </a:t>
+            </a:r>
+            <a:r>
+              <a:rPr lang="es-ES" sz="1600" dirty="0"/>
+              <a:t>servida a las 17:00 horas. Compuesta por: café, leche, infusión y mini- pastelitos</a:t>
+            </a:r>
+            <a:r>
+              <a:rPr lang="es-ES" sz="1600" dirty="0" smtClean="0"/>
+              <a:t>.</a:t>
+            </a:r>
+            <a:endParaRPr lang="es-ES" sz="1600" dirty="0"/>
+          </a:p>
+          <a:p>
+            <a:r>
+              <a:rPr lang="es-ES" sz="1600" b="1" u="sng" dirty="0" smtClean="0"/>
+              <a:t>SÁBADO </a:t>
+            </a:r>
+            <a:r>
+              <a:rPr lang="es-ES" sz="1600" b="1" u="sng" dirty="0"/>
+              <a:t>16:</a:t>
+            </a:r>
+            <a:endParaRPr lang="es-ES" sz="1600" dirty="0"/>
+          </a:p>
+          <a:p>
+            <a:r>
+              <a:rPr lang="es-ES" sz="1600" u="sng" dirty="0"/>
+              <a:t>Almuerzo:</a:t>
+            </a:r>
+            <a:r>
+              <a:rPr lang="es-ES" sz="1600" dirty="0"/>
+              <a:t> </a:t>
+            </a:r>
+            <a:r>
+              <a:rPr lang="es-ES" sz="1600" dirty="0" smtClean="0"/>
+              <a:t>Pinchos </a:t>
+            </a:r>
+            <a:r>
+              <a:rPr lang="es-ES" sz="1600" dirty="0"/>
+              <a:t>de empanada, medias noches (mechada, manzana y alioli),croquetas y chupito de gazpacho.12 platos de jamón y tres bebidas por persona. Dos piezas de cada pincho por comensal.</a:t>
+            </a:r>
+          </a:p>
+          <a:p>
+            <a:r>
+              <a:rPr lang="es-ES" sz="1600" b="1" u="sng" dirty="0"/>
+              <a:t>DOMINGO 17</a:t>
+            </a:r>
+            <a:r>
+              <a:rPr lang="es-ES" sz="1600" dirty="0"/>
+              <a:t>:</a:t>
+            </a:r>
+          </a:p>
+          <a:p>
+            <a:r>
+              <a:rPr lang="es-ES" sz="1600" u="sng" dirty="0"/>
+              <a:t>Almuerzo:</a:t>
+            </a:r>
+            <a:r>
+              <a:rPr lang="es-ES" sz="1600" dirty="0"/>
+              <a:t> </a:t>
+            </a:r>
+            <a:r>
+              <a:rPr lang="es-ES" sz="1600" dirty="0" smtClean="0"/>
+              <a:t>Pinchos </a:t>
+            </a:r>
+            <a:r>
+              <a:rPr lang="es-ES" sz="1600" dirty="0"/>
+              <a:t>de tortilla, empanada, piruleta de buey y chupito de gazpacho. 12 platos de jamón y tres bebidas por  persona. Dos piezas de cada pincho por comensal.</a:t>
+            </a:r>
+          </a:p>
+          <a:p>
+            <a:endParaRPr lang="es-ES" sz="1600" b="1" dirty="0"/>
+          </a:p>
+        </p:txBody>
+      </p:sp>
+    </p:spTree>
+    <p:extLst>
+      <p:ext uri="{BB962C8B-B14F-4D97-AF65-F5344CB8AC3E}">
+        <p14:creationId xmlns:p14="http://schemas.microsoft.com/office/powerpoint/2010/main" val="48865419"/>
+      </p:ext>
+    </p:extLst>
+  </p:cSld>
+  <p:clrMapOvr>
+    <a:masterClrMapping/>
+  </p:clrMapOvr>
+  <mc:AlternateContent xmlns:mc="http://schemas.openxmlformats.org/markup-compatibility/2006">
+    <mc:Choice xmlns:p14="http://schemas.microsoft.com/office/powerpoint/2010/main" Requires="p14">
+      <p:transition p14:dur="0"/>
+    </mc:Choice>
+    <mc:Fallback>
+      <p:transition/>
+    </mc:Fallback>
+  </mc:AlternateContent>
+  <p:timing>
+    <p:tnLst>
+      <p:par>
+        <p:cTn id="1" dur="indefinite" restart="never" nodeType="tmRoot"/>
+      </p:par>
+    </p:tnLst>
+  </p:timing>
+</p:sld>
+</file>
+
+<file path=ppt/slides/slide7.xml><?xml version="1.0" encoding="utf-8"?>
+<p:sld xmlns:a="http://schemas.openxmlformats.org/drawingml/2006/main" xmlns:r="http://schemas.openxmlformats.org/officeDocument/2006/relationships" xmlns:p="http://schemas.openxmlformats.org/presentationml/2006/main">
+  <p:cSld>
+    <p:spTree>
+      <p:nvGrpSpPr>
+        <p:cNvPr id="1" name=""/>
+        <p:cNvGrpSpPr/>
+        <p:nvPr/>
+      </p:nvGrpSpPr>
+      <p:grpSpPr>
+        <a:xfrm>
+          <a:off x="0" y="0"/>
+          <a:ext cx="0" cy="0"/>
+          <a:chOff x="0" y="0"/>
+          <a:chExt cx="0" cy="0"/>
+        </a:xfrm>
+      </p:grpSpPr>
+      <p:sp>
+        <p:nvSpPr>
+          <p:cNvPr id="10" name="Title 4"/>
+          <p:cNvSpPr>
+            <a:spLocks noGrp="1" noChangeAspect="1"/>
+          </p:cNvSpPr>
+          <p:nvPr>
+            <p:ph type="title"/>
+          </p:nvPr>
+        </p:nvSpPr>
+        <p:spPr>
+          <a:xfrm>
+            <a:off x="509456" y="228600"/>
+            <a:ext cx="11173091" cy="811248"/>
+          </a:xfrm>
+        </p:spPr>
+        <p:txBody>
+          <a:bodyPr/>
+          <a:lstStyle/>
+          <a:p>
+            <a:r>
               <a:rPr lang="en-GB" sz="5400" dirty="0" err="1" smtClean="0"/>
               <a:t>Premios</a:t>
             </a:r>
@@ -28598,7 +29265,7 @@
 </p:sld>
 </file>
 
-<file path=ppt/slides/slide7.xml><?xml version="1.0" encoding="utf-8"?>
+<file path=ppt/slides/slide8.xml><?xml version="1.0" encoding="utf-8"?>
 <p:sld xmlns:a="http://schemas.openxmlformats.org/drawingml/2006/main" xmlns:r="http://schemas.openxmlformats.org/officeDocument/2006/relationships" xmlns:p="http://schemas.openxmlformats.org/presentationml/2006/main">
   <p:cSld>
     <p:spTree>
@@ -28851,7 +29518,7 @@
 </p:sld>
 </file>
 
-<file path=ppt/slides/slide8.xml><?xml version="1.0" encoding="utf-8"?>
+<file path=ppt/slides/slide9.xml><?xml version="1.0" encoding="utf-8"?>
 <p:sld xmlns:a="http://schemas.openxmlformats.org/drawingml/2006/main" xmlns:r="http://schemas.openxmlformats.org/officeDocument/2006/relationships" xmlns:p="http://schemas.openxmlformats.org/presentationml/2006/main">
   <p:cSld>
     <p:spTree>
@@ -29190,341 +29857,6 @@
             </p:seq>
           </p:childTnLst>
         </p:cTn>
-      </p:par>
-    </p:tnLst>
-  </p:timing>
-</p:sld>
-</file>
-
-<file path=ppt/slides/slide9.xml><?xml version="1.0" encoding="utf-8"?>
-<p:sld xmlns:a="http://schemas.openxmlformats.org/drawingml/2006/main" xmlns:r="http://schemas.openxmlformats.org/officeDocument/2006/relationships" xmlns:p="http://schemas.openxmlformats.org/presentationml/2006/main">
-  <p:cSld>
-    <p:spTree>
-      <p:nvGrpSpPr>
-        <p:cNvPr id="1" name=""/>
-        <p:cNvGrpSpPr/>
-        <p:nvPr/>
-      </p:nvGrpSpPr>
-      <p:grpSpPr>
-        <a:xfrm>
-          <a:off x="0" y="0"/>
-          <a:ext cx="0" cy="0"/>
-          <a:chOff x="0" y="0"/>
-          <a:chExt cx="0" cy="0"/>
-        </a:xfrm>
-      </p:grpSpPr>
-      <p:sp>
-        <p:nvSpPr>
-          <p:cNvPr id="2" name="Title 3"/>
-          <p:cNvSpPr txBox="1">
-            <a:spLocks/>
-          </p:cNvSpPr>
-          <p:nvPr/>
-        </p:nvSpPr>
-        <p:spPr>
-          <a:xfrm>
-            <a:off x="278362" y="405426"/>
-            <a:ext cx="11533177" cy="517065"/>
-          </a:xfrm>
-          <a:prstGeom prst="rect">
-            <a:avLst/>
-          </a:prstGeom>
-        </p:spPr>
-        <p:txBody>
-          <a:bodyPr vert="horz" wrap="square" lIns="0" tIns="0" rIns="0" bIns="0" rtlCol="0" anchor="t" anchorCtr="0">
-            <a:spAutoFit/>
-          </a:bodyPr>
-          <a:lstStyle>
-            <a:lvl1pPr algn="l" defTabSz="914400" rtl="0" eaLnBrk="1" latinLnBrk="0" hangingPunct="1">
-              <a:lnSpc>
-                <a:spcPct val="105000"/>
-              </a:lnSpc>
-              <a:spcBef>
-                <a:spcPct val="0"/>
-              </a:spcBef>
-              <a:buNone/>
-              <a:defRPr sz="2400" kern="1200" spc="0" baseline="0">
-                <a:solidFill>
-                  <a:schemeClr val="accent1"/>
-                </a:solidFill>
-                <a:latin typeface="+mj-lt"/>
-                <a:ea typeface="+mj-ea"/>
-                <a:cs typeface="+mj-cs"/>
-              </a:defRPr>
-            </a:lvl1pPr>
-          </a:lstStyle>
-          <a:p>
-            <a:r>
-              <a:rPr lang="en-US" sz="3200"/>
-              <a:t>Preguntas y respuestas.</a:t>
-            </a:r>
-            <a:endParaRPr lang="ru-RU" sz="3200" dirty="0"/>
-          </a:p>
-        </p:txBody>
-      </p:sp>
-      <p:sp>
-        <p:nvSpPr>
-          <p:cNvPr id="3" name="Text Placeholder 1"/>
-          <p:cNvSpPr>
-            <a:spLocks noGrp="1"/>
-          </p:cNvSpPr>
-          <p:nvPr>
-            <p:ph type="body" sz="quarter" idx="20"/>
-          </p:nvPr>
-        </p:nvSpPr>
-        <p:spPr>
-          <a:xfrm>
-            <a:off x="335360" y="1435101"/>
-            <a:ext cx="11461195" cy="841772"/>
-          </a:xfrm>
-        </p:spPr>
-        <p:txBody>
-          <a:bodyPr/>
-          <a:lstStyle/>
-          <a:p>
-            <a:r>
-              <a:rPr lang="en-US" sz="3733" dirty="0"/>
-              <a:t>¿</a:t>
-            </a:r>
-            <a:r>
-              <a:rPr lang="en-US" sz="3733" dirty="0" err="1"/>
-              <a:t>Dudas</a:t>
-            </a:r>
-            <a:r>
-              <a:rPr lang="en-US" sz="3733" dirty="0"/>
-              <a:t>?</a:t>
-            </a:r>
-            <a:endParaRPr lang="ru-RU" sz="3733" dirty="0"/>
-          </a:p>
-        </p:txBody>
-      </p:sp>
-      <p:sp>
-        <p:nvSpPr>
-          <p:cNvPr id="4" name="Text Placeholder 1"/>
-          <p:cNvSpPr txBox="1">
-            <a:spLocks/>
-          </p:cNvSpPr>
-          <p:nvPr/>
-        </p:nvSpPr>
-        <p:spPr>
-          <a:xfrm>
-            <a:off x="431371" y="2084851"/>
-            <a:ext cx="11261672" cy="3072341"/>
-          </a:xfrm>
-          <a:prstGeom prst="rect">
-            <a:avLst/>
-          </a:prstGeom>
-        </p:spPr>
-        <p:txBody>
-          <a:bodyPr vert="horz" lIns="121920" tIns="0" rIns="121920" bIns="60960" rtlCol="0">
-            <a:noAutofit/>
-          </a:bodyPr>
-          <a:lstStyle>
-            <a:lvl1pPr marL="0" indent="0" algn="l" defTabSz="914400" rtl="0" eaLnBrk="1" latinLnBrk="0" hangingPunct="1">
-              <a:spcBef>
-                <a:spcPct val="20000"/>
-              </a:spcBef>
-              <a:buFont typeface="Arial" pitchFamily="34" charset="0"/>
-              <a:buNone/>
-              <a:defRPr sz="2800" kern="1200">
-                <a:solidFill>
-                  <a:schemeClr val="bg1"/>
-                </a:solidFill>
-                <a:latin typeface="+mn-lt"/>
-                <a:ea typeface="+mn-ea"/>
-                <a:cs typeface="+mn-cs"/>
-              </a:defRPr>
-            </a:lvl1pPr>
-            <a:lvl2pPr marL="0" indent="0" algn="l" defTabSz="914400" rtl="0" eaLnBrk="1" latinLnBrk="0" hangingPunct="1">
-              <a:spcBef>
-                <a:spcPct val="20000"/>
-              </a:spcBef>
-              <a:buFont typeface="Arial" pitchFamily="34" charset="0"/>
-              <a:buNone/>
-              <a:defRPr sz="1600" kern="1200">
-                <a:solidFill>
-                  <a:schemeClr val="tx2"/>
-                </a:solidFill>
-                <a:latin typeface="+mn-lt"/>
-                <a:ea typeface="+mn-ea"/>
-                <a:cs typeface="+mn-cs"/>
-              </a:defRPr>
-            </a:lvl2pPr>
-            <a:lvl3pPr marL="447675" indent="-180975" algn="l" defTabSz="914400" rtl="0" eaLnBrk="1" latinLnBrk="0" hangingPunct="1">
-              <a:spcBef>
-                <a:spcPct val="20000"/>
-              </a:spcBef>
-              <a:buClr>
-                <a:schemeClr val="accent1"/>
-              </a:buClr>
-              <a:buSzPct val="120000"/>
-              <a:buFont typeface="Arial" pitchFamily="34" charset="0"/>
-              <a:buChar char="•"/>
-              <a:defRPr sz="1600" kern="1200">
-                <a:solidFill>
-                  <a:schemeClr val="tx2"/>
-                </a:solidFill>
-                <a:latin typeface="+mn-lt"/>
-                <a:ea typeface="+mn-ea"/>
-                <a:cs typeface="+mn-cs"/>
-              </a:defRPr>
-            </a:lvl3pPr>
-            <a:lvl4pPr marL="714375" indent="-266700" algn="l" defTabSz="914400" rtl="0" eaLnBrk="1" latinLnBrk="0" hangingPunct="1">
-              <a:spcBef>
-                <a:spcPct val="20000"/>
-              </a:spcBef>
-              <a:buClr>
-                <a:schemeClr val="accent1"/>
-              </a:buClr>
-              <a:buFont typeface="Arial" pitchFamily="34" charset="0"/>
-              <a:buChar char="–"/>
-              <a:defRPr sz="1600" kern="1200">
-                <a:solidFill>
-                  <a:schemeClr val="tx2"/>
-                </a:solidFill>
-                <a:latin typeface="+mn-lt"/>
-                <a:ea typeface="+mn-ea"/>
-                <a:cs typeface="+mn-cs"/>
-              </a:defRPr>
-            </a:lvl4pPr>
-            <a:lvl5pPr marL="990600" indent="-276225" algn="l" defTabSz="914400" rtl="0" eaLnBrk="1" latinLnBrk="0" hangingPunct="1">
-              <a:spcBef>
-                <a:spcPct val="20000"/>
-              </a:spcBef>
-              <a:buClr>
-                <a:schemeClr val="accent1"/>
-              </a:buClr>
-              <a:buFont typeface="Arial" pitchFamily="34" charset="0"/>
-              <a:buChar char="»"/>
-              <a:defRPr sz="1600" kern="1200">
-                <a:solidFill>
-                  <a:schemeClr val="tx2"/>
-                </a:solidFill>
-                <a:latin typeface="+mn-lt"/>
-                <a:ea typeface="+mn-ea"/>
-                <a:cs typeface="+mn-cs"/>
-              </a:defRPr>
-            </a:lvl5pPr>
-            <a:lvl6pPr marL="2514600" indent="-228600" algn="l" defTabSz="914400" rtl="0" eaLnBrk="1" latinLnBrk="0" hangingPunct="1">
-              <a:spcBef>
-                <a:spcPct val="20000"/>
-              </a:spcBef>
-              <a:buFont typeface="Arial" pitchFamily="34" charset="0"/>
-              <a:buChar char="•"/>
-              <a:defRPr sz="2000" kern="1200">
-                <a:solidFill>
-                  <a:schemeClr val="tx1"/>
-                </a:solidFill>
-                <a:latin typeface="+mn-lt"/>
-                <a:ea typeface="+mn-ea"/>
-                <a:cs typeface="+mn-cs"/>
-              </a:defRPr>
-            </a:lvl6pPr>
-            <a:lvl7pPr marL="2971800" indent="-228600" algn="l" defTabSz="914400" rtl="0" eaLnBrk="1" latinLnBrk="0" hangingPunct="1">
-              <a:spcBef>
-                <a:spcPct val="20000"/>
-              </a:spcBef>
-              <a:buFont typeface="Arial" pitchFamily="34" charset="0"/>
-              <a:buChar char="•"/>
-              <a:defRPr sz="2000" kern="1200">
-                <a:solidFill>
-                  <a:schemeClr val="tx1"/>
-                </a:solidFill>
-                <a:latin typeface="+mn-lt"/>
-                <a:ea typeface="+mn-ea"/>
-                <a:cs typeface="+mn-cs"/>
-              </a:defRPr>
-            </a:lvl7pPr>
-            <a:lvl8pPr marL="3429000" indent="-228600" algn="l" defTabSz="914400" rtl="0" eaLnBrk="1" latinLnBrk="0" hangingPunct="1">
-              <a:spcBef>
-                <a:spcPct val="20000"/>
-              </a:spcBef>
-              <a:buFont typeface="Arial" pitchFamily="34" charset="0"/>
-              <a:buChar char="•"/>
-              <a:defRPr sz="2000" kern="1200">
-                <a:solidFill>
-                  <a:schemeClr val="tx1"/>
-                </a:solidFill>
-                <a:latin typeface="+mn-lt"/>
-                <a:ea typeface="+mn-ea"/>
-                <a:cs typeface="+mn-cs"/>
-              </a:defRPr>
-            </a:lvl8pPr>
-            <a:lvl9pPr marL="3886200" indent="-228600" algn="l" defTabSz="914400" rtl="0" eaLnBrk="1" latinLnBrk="0" hangingPunct="1">
-              <a:spcBef>
-                <a:spcPct val="20000"/>
-              </a:spcBef>
-              <a:buFont typeface="Arial" pitchFamily="34" charset="0"/>
-              <a:buChar char="•"/>
-              <a:defRPr sz="2000" kern="1200">
-                <a:solidFill>
-                  <a:schemeClr val="tx1"/>
-                </a:solidFill>
-                <a:latin typeface="+mn-lt"/>
-                <a:ea typeface="+mn-ea"/>
-                <a:cs typeface="+mn-cs"/>
-              </a:defRPr>
-            </a:lvl9pPr>
-          </a:lstStyle>
-          <a:p>
-            <a:pPr algn="ctr"/>
-            <a:r>
-              <a:rPr lang="en-US" sz="22133" dirty="0">
-                <a:solidFill>
-                  <a:schemeClr val="accent1"/>
-                </a:solidFill>
-                <a:latin typeface="Aller" pitchFamily="2" charset="0"/>
-              </a:rPr>
-              <a:t>P</a:t>
-            </a:r>
-            <a:r>
-              <a:rPr lang="en-US" sz="11733" dirty="0">
-                <a:solidFill>
-                  <a:schemeClr val="accent1"/>
-                </a:solidFill>
-                <a:latin typeface="Aller" pitchFamily="2" charset="0"/>
-              </a:rPr>
-              <a:t>&amp;</a:t>
-            </a:r>
-            <a:r>
-              <a:rPr lang="en-US" sz="22133" dirty="0">
-                <a:solidFill>
-                  <a:schemeClr val="accent1"/>
-                </a:solidFill>
-                <a:latin typeface="Aller" pitchFamily="2" charset="0"/>
-              </a:rPr>
-              <a:t>R</a:t>
-            </a:r>
-            <a:endParaRPr lang="ru-RU" sz="22133" dirty="0">
-              <a:solidFill>
-                <a:schemeClr val="accent1"/>
-              </a:solidFill>
-            </a:endParaRPr>
-          </a:p>
-        </p:txBody>
-      </p:sp>
-    </p:spTree>
-    <p:extLst>
-      <p:ext uri="{BB962C8B-B14F-4D97-AF65-F5344CB8AC3E}">
-        <p14:creationId xmlns:p14="http://schemas.microsoft.com/office/powerpoint/2010/main" val="2924883636"/>
-      </p:ext>
-    </p:extLst>
-  </p:cSld>
-  <p:clrMapOvr>
-    <a:masterClrMapping/>
-  </p:clrMapOvr>
-  <mc:AlternateContent xmlns:mc="http://schemas.openxmlformats.org/markup-compatibility/2006" xmlns:p14="http://schemas.microsoft.com/office/powerpoint/2010/main">
-    <mc:Choice Requires="p14">
-      <p:transition p14:dur="0"/>
-    </mc:Choice>
-    <mc:Fallback xmlns="">
-      <p:transition/>
-    </mc:Fallback>
-  </mc:AlternateContent>
-  <p:timing>
-    <p:tnLst>
-      <p:par>
-        <p:cTn id="1" dur="indefinite" restart="never" nodeType="tmRoot"/>
       </p:par>
     </p:tnLst>
   </p:timing>
@@ -30117,15 +30449,6 @@
 </file>
 
 <file path=customXml/item2.xml><?xml version="1.0" encoding="utf-8"?>
-<?mso-contentType ?>
-<FormTemplates xmlns="http://schemas.microsoft.com/sharepoint/v3/contenttype/forms">
-  <Display>DocumentLibraryForm</Display>
-  <Edit>DocumentLibraryForm</Edit>
-  <New>DocumentLibraryForm</New>
-</FormTemplates>
-</file>
-
-<file path=customXml/item3.xml><?xml version="1.0" encoding="utf-8"?>
 <ct:contentTypeSchema xmlns:ct="http://schemas.microsoft.com/office/2006/metadata/contentType" xmlns:ma="http://schemas.microsoft.com/office/2006/metadata/properties/metaAttributes" ct:_="" ma:_="" ma:contentTypeName="Document" ma:contentTypeID="0x01010077A91A40830EBD43BE524A7CE4B3AE1E" ma:contentTypeVersion="" ma:contentTypeDescription="Create a new document." ma:contentTypeScope="" ma:versionID="564620281baef6ba28e9e829bb933c81">
   <xsd:schema xmlns:xsd="http://www.w3.org/2001/XMLSchema" xmlns:xs="http://www.w3.org/2001/XMLSchema" xmlns:p="http://schemas.microsoft.com/office/2006/metadata/properties" xmlns:ns2="EEE5B532-0FC6-42A2-92D4-EABE09DEBFCC" targetNamespace="http://schemas.microsoft.com/office/2006/metadata/properties" ma:root="true" ma:fieldsID="e0bdcf4237a0a33696396f5b9319db96" ns2:_="">
     <xsd:import namespace="EEE5B532-0FC6-42A2-92D4-EABE09DEBFCC"/>
@@ -30281,6 +30604,15 @@
 </ct:contentTypeSchema>
 </file>
 
+<file path=customXml/item3.xml><?xml version="1.0" encoding="utf-8"?>
+<?mso-contentType ?>
+<FormTemplates xmlns="http://schemas.microsoft.com/sharepoint/v3/contenttype/forms">
+  <Display>DocumentLibraryForm</Display>
+  <Edit>DocumentLibraryForm</Edit>
+  <New>DocumentLibraryForm</New>
+</FormTemplates>
+</file>
+
 <file path=customXml/itemProps1.xml><?xml version="1.0" encoding="utf-8"?>
 <ds:datastoreItem xmlns:ds="http://schemas.openxmlformats.org/officeDocument/2006/customXml" ds:itemID="{FF5E1494-6B65-4E1E-9729-2B216CB62627}">
   <ds:schemaRefs>
@@ -30298,14 +30630,6 @@
 </file>
 
 <file path=customXml/itemProps2.xml><?xml version="1.0" encoding="utf-8"?>
-<ds:datastoreItem xmlns:ds="http://schemas.openxmlformats.org/officeDocument/2006/customXml" ds:itemID="{56A11EA6-2FC2-46BC-88D1-DD1545DDA3D6}">
-  <ds:schemaRefs>
-    <ds:schemaRef ds:uri="http://schemas.microsoft.com/sharepoint/v3/contenttype/forms"/>
-  </ds:schemaRefs>
-</ds:datastoreItem>
-</file>
-
-<file path=customXml/itemProps3.xml><?xml version="1.0" encoding="utf-8"?>
 <ds:datastoreItem xmlns:ds="http://schemas.openxmlformats.org/officeDocument/2006/customXml" ds:itemID="{DE9A42DE-7C1D-459D-B825-997C7A9B9B0F}">
   <ds:schemaRefs>
     <ds:schemaRef ds:uri="http://schemas.microsoft.com/office/2006/metadata/contentType"/>
@@ -30321,4 +30645,12 @@
     <ds:schemaRef ds:uri="http://schemas.microsoft.com/internal/obd"/>
   </ds:schemaRefs>
 </ds:datastoreItem>
+</file>
+
+<file path=customXml/itemProps3.xml><?xml version="1.0" encoding="utf-8"?>
+<ds:datastoreItem xmlns:ds="http://schemas.openxmlformats.org/officeDocument/2006/customXml" ds:itemID="{56A11EA6-2FC2-46BC-88D1-DD1545DDA3D6}">
+  <ds:schemaRefs>
+    <ds:schemaRef ds:uri="http://schemas.microsoft.com/sharepoint/v3/contenttype/forms"/>
+  </ds:schemaRefs>
+</ds:datastoreItem>
 </file>
</xml_diff>

<commit_message>
Changes in W10 Game Jam PPTX
</commit_message>
<xml_diff>
--- a/Windows 10 Game Jam/Windows 10 GameJam Sevilla.pptx
+++ b/Windows 10 Game Jam/Windows 10 GameJam Sevilla.pptx
@@ -210,7 +210,7 @@
           <a:p>
             <a:fld id="{B390C43E-5EEF-443B-AEB9-2D45B8F4AF4F}" type="datetimeFigureOut">
               <a:rPr lang="en-US" smtClean="0"/>
-              <a:t>5/13/2015</a:t>
+              <a:t>5/14/2015</a:t>
             </a:fld>
             <a:endParaRPr lang="en-US"/>
           </a:p>
@@ -20307,7 +20307,7 @@
                 </a:solidFill>
               </a:rPr>
               <a:pPr/>
-              <a:t>5/13/2015</a:t>
+              <a:t>5/14/2015</a:t>
             </a:fld>
             <a:endParaRPr lang="en-US">
               <a:solidFill>
@@ -20630,7 +20630,7 @@
           <a:p>
             <a:fld id="{6DD3B76A-C5DE-4B9A-BEAE-BBF0DC17AAA8}" type="datetime1">
               <a:rPr lang="en-US" smtClean="0"/>
-              <a:t>5/13/2015</a:t>
+              <a:t>5/14/2015</a:t>
             </a:fld>
             <a:endParaRPr lang="en-US" dirty="0"/>
           </a:p>
@@ -28367,14 +28367,14 @@
           <a:effectLst/>
           <a:extLst>
             <a:ext uri="{909E8E84-426E-40dd-AFC4-6F175D3DCCD1}">
-              <a14:hiddenFill xmlns="" xmlns:a14="http://schemas.microsoft.com/office/drawing/2010/main">
+              <a14:hiddenFill xmlns:a14="http://schemas.microsoft.com/office/drawing/2010/main" xmlns="">
                 <a:solidFill>
                   <a:schemeClr val="accent1"/>
                 </a:solidFill>
               </a14:hiddenFill>
             </a:ext>
             <a:ext uri="{91240B29-F687-4f45-9708-019B960494DF}">
-              <a14:hiddenLine xmlns="" xmlns:a14="http://schemas.microsoft.com/office/drawing/2010/main" w="9525">
+              <a14:hiddenLine xmlns:a14="http://schemas.microsoft.com/office/drawing/2010/main" xmlns="" w="9525">
                 <a:solidFill>
                   <a:schemeClr val="tx1"/>
                 </a:solidFill>
@@ -28384,7 +28384,7 @@
               </a14:hiddenLine>
             </a:ext>
             <a:ext uri="{AF507438-7753-43e0-B8FC-AC1667EBCBE1}">
-              <a14:hiddenEffects xmlns="" xmlns:a14="http://schemas.microsoft.com/office/drawing/2010/main">
+              <a14:hiddenEffects xmlns:a14="http://schemas.microsoft.com/office/drawing/2010/main" xmlns="">
                 <a:effectLst>
                   <a:outerShdw dist="35921" dir="2700000" algn="ctr" rotWithShape="0">
                     <a:schemeClr val="bg2"/>
@@ -28716,7 +28716,28 @@
                 <a:latin typeface="Segoe WP"/>
                 <a:cs typeface="Segoe WP"/>
               </a:rPr>
-              <a:t>Duración: 60 min</a:t>
+              <a:t>Duración: </a:t>
+            </a:r>
+            <a:r>
+              <a:rPr lang="es-ES" sz="2133" dirty="0" smtClean="0">
+                <a:latin typeface="Segoe WP"/>
+                <a:cs typeface="Segoe WP"/>
+              </a:rPr>
+              <a:t>55</a:t>
+            </a:r>
+            <a:r>
+              <a:rPr lang="es-ES" sz="2133" dirty="0" smtClean="0">
+                <a:latin typeface="Segoe WP"/>
+                <a:cs typeface="Segoe WP"/>
+              </a:rPr>
+              <a:t> </a:t>
+            </a:r>
+            <a:r>
+              <a:rPr lang="es-ES" sz="2133" dirty="0">
+                <a:latin typeface="Segoe WP"/>
+                <a:cs typeface="Segoe WP"/>
+              </a:rPr>
+              <a:t>min</a:t>
             </a:r>
             <a:r>
               <a:rPr lang="es-ES" sz="2133" dirty="0"/>
@@ -28961,11 +28982,11 @@
   <p:clrMapOvr>
     <a:masterClrMapping/>
   </p:clrMapOvr>
-  <mc:AlternateContent xmlns:mc="http://schemas.openxmlformats.org/markup-compatibility/2006">
-    <mc:Choice xmlns:p14="http://schemas.microsoft.com/office/powerpoint/2010/main" Requires="p14">
+  <mc:AlternateContent xmlns:mc="http://schemas.openxmlformats.org/markup-compatibility/2006" xmlns:p14="http://schemas.microsoft.com/office/powerpoint/2010/main">
+    <mc:Choice Requires="p14">
       <p:transition p14:dur="0"/>
     </mc:Choice>
-    <mc:Fallback>
+    <mc:Fallback xmlns="">
       <p:transition/>
     </mc:Fallback>
   </mc:AlternateContent>
@@ -30439,16 +30460,6 @@
 </file>
 
 <file path=customXml/item1.xml><?xml version="1.0" encoding="utf-8"?>
-<p:properties xmlns:p="http://schemas.microsoft.com/office/2006/metadata/properties" xmlns:xsi="http://www.w3.org/2001/XMLSchema-instance" xmlns:pc="http://schemas.microsoft.com/office/infopath/2007/PartnerControls">
-  <documentManagement>
-    <Module xmlns="EEE5B532-0FC6-42A2-92D4-EABE09DEBFCC" xsi:nil="true"/>
-    <Status xmlns="EEE5B532-0FC6-42A2-92D4-EABE09DEBFCC">Final</Status>
-    <Content_x0020_Type xmlns="EEE5B532-0FC6-42A2-92D4-EABE09DEBFCC">Slide Presentation</Content_x0020_Type>
-  </documentManagement>
-</p:properties>
-</file>
-
-<file path=customXml/item2.xml><?xml version="1.0" encoding="utf-8"?>
 <ct:contentTypeSchema xmlns:ct="http://schemas.microsoft.com/office/2006/metadata/contentType" xmlns:ma="http://schemas.microsoft.com/office/2006/metadata/properties/metaAttributes" ct:_="" ma:_="" ma:contentTypeName="Document" ma:contentTypeID="0x01010077A91A40830EBD43BE524A7CE4B3AE1E" ma:contentTypeVersion="" ma:contentTypeDescription="Create a new document." ma:contentTypeScope="" ma:versionID="564620281baef6ba28e9e829bb933c81">
   <xsd:schema xmlns:xsd="http://www.w3.org/2001/XMLSchema" xmlns:xs="http://www.w3.org/2001/XMLSchema" xmlns:p="http://schemas.microsoft.com/office/2006/metadata/properties" xmlns:ns2="EEE5B532-0FC6-42A2-92D4-EABE09DEBFCC" targetNamespace="http://schemas.microsoft.com/office/2006/metadata/properties" ma:root="true" ma:fieldsID="e0bdcf4237a0a33696396f5b9319db96" ns2:_="">
     <xsd:import namespace="EEE5B532-0FC6-42A2-92D4-EABE09DEBFCC"/>
@@ -30604,6 +30615,16 @@
 </ct:contentTypeSchema>
 </file>
 
+<file path=customXml/item2.xml><?xml version="1.0" encoding="utf-8"?>
+<p:properties xmlns:p="http://schemas.microsoft.com/office/2006/metadata/properties" xmlns:xsi="http://www.w3.org/2001/XMLSchema-instance" xmlns:pc="http://schemas.microsoft.com/office/infopath/2007/PartnerControls">
+  <documentManagement>
+    <Module xmlns="EEE5B532-0FC6-42A2-92D4-EABE09DEBFCC" xsi:nil="true"/>
+    <Status xmlns="EEE5B532-0FC6-42A2-92D4-EABE09DEBFCC">Final</Status>
+    <Content_x0020_Type xmlns="EEE5B532-0FC6-42A2-92D4-EABE09DEBFCC">Slide Presentation</Content_x0020_Type>
+  </documentManagement>
+</p:properties>
+</file>
+
 <file path=customXml/item3.xml><?xml version="1.0" encoding="utf-8"?>
 <?mso-contentType ?>
 <FormTemplates xmlns="http://schemas.microsoft.com/sharepoint/v3/contenttype/forms">
@@ -30614,22 +30635,6 @@
 </file>
 
 <file path=customXml/itemProps1.xml><?xml version="1.0" encoding="utf-8"?>
-<ds:datastoreItem xmlns:ds="http://schemas.openxmlformats.org/officeDocument/2006/customXml" ds:itemID="{FF5E1494-6B65-4E1E-9729-2B216CB62627}">
-  <ds:schemaRefs>
-    <ds:schemaRef ds:uri="http://purl.org/dc/elements/1.1/"/>
-    <ds:schemaRef ds:uri="EEE5B532-0FC6-42A2-92D4-EABE09DEBFCC"/>
-    <ds:schemaRef ds:uri="http://purl.org/dc/terms/"/>
-    <ds:schemaRef ds:uri="http://schemas.microsoft.com/office/2006/metadata/properties"/>
-    <ds:schemaRef ds:uri="http://schemas.microsoft.com/office/2006/documentManagement/types"/>
-    <ds:schemaRef ds:uri="http://schemas.microsoft.com/office/infopath/2007/PartnerControls"/>
-    <ds:schemaRef ds:uri="http://schemas.openxmlformats.org/package/2006/metadata/core-properties"/>
-    <ds:schemaRef ds:uri="http://www.w3.org/XML/1998/namespace"/>
-    <ds:schemaRef ds:uri="http://purl.org/dc/dcmitype/"/>
-  </ds:schemaRefs>
-</ds:datastoreItem>
-</file>
-
-<file path=customXml/itemProps2.xml><?xml version="1.0" encoding="utf-8"?>
 <ds:datastoreItem xmlns:ds="http://schemas.openxmlformats.org/officeDocument/2006/customXml" ds:itemID="{DE9A42DE-7C1D-459D-B825-997C7A9B9B0F}">
   <ds:schemaRefs>
     <ds:schemaRef ds:uri="http://schemas.microsoft.com/office/2006/metadata/contentType"/>
@@ -30647,6 +30652,22 @@
 </ds:datastoreItem>
 </file>
 
+<file path=customXml/itemProps2.xml><?xml version="1.0" encoding="utf-8"?>
+<ds:datastoreItem xmlns:ds="http://schemas.openxmlformats.org/officeDocument/2006/customXml" ds:itemID="{FF5E1494-6B65-4E1E-9729-2B216CB62627}">
+  <ds:schemaRefs>
+    <ds:schemaRef ds:uri="http://purl.org/dc/elements/1.1/"/>
+    <ds:schemaRef ds:uri="EEE5B532-0FC6-42A2-92D4-EABE09DEBFCC"/>
+    <ds:schemaRef ds:uri="http://purl.org/dc/terms/"/>
+    <ds:schemaRef ds:uri="http://schemas.microsoft.com/office/2006/metadata/properties"/>
+    <ds:schemaRef ds:uri="http://schemas.microsoft.com/office/2006/documentManagement/types"/>
+    <ds:schemaRef ds:uri="http://schemas.microsoft.com/office/infopath/2007/PartnerControls"/>
+    <ds:schemaRef ds:uri="http://schemas.openxmlformats.org/package/2006/metadata/core-properties"/>
+    <ds:schemaRef ds:uri="http://www.w3.org/XML/1998/namespace"/>
+    <ds:schemaRef ds:uri="http://purl.org/dc/dcmitype/"/>
+  </ds:schemaRefs>
+</ds:datastoreItem>
+</file>
+
 <file path=customXml/itemProps3.xml><?xml version="1.0" encoding="utf-8"?>
 <ds:datastoreItem xmlns:ds="http://schemas.openxmlformats.org/officeDocument/2006/customXml" ds:itemID="{56A11EA6-2FC2-46BC-88D1-DD1545DDA3D6}">
   <ds:schemaRefs>

</xml_diff>